<commit_message>
updated presentation, change food reward, update espilon
</commit_message>
<xml_diff>
--- a/presentation/ece559b_presentation.pptx
+++ b/presentation/ece559b_presentation.pptx
@@ -12,7 +12,7 @@
     <p:sldMasterId id="2147483730" r:id="rId8"/>
   </p:sldMasterIdLst>
   <p:notesMasterIdLst>
-    <p:notesMasterId r:id="rId24"/>
+    <p:notesMasterId r:id="rId25"/>
   </p:notesMasterIdLst>
   <p:sldIdLst>
     <p:sldId id="256" r:id="rId9"/>
@@ -20,16 +20,17 @@
     <p:sldId id="262" r:id="rId11"/>
     <p:sldId id="257" r:id="rId12"/>
     <p:sldId id="261" r:id="rId13"/>
-    <p:sldId id="270" r:id="rId14"/>
-    <p:sldId id="263" r:id="rId15"/>
-    <p:sldId id="260" r:id="rId16"/>
-    <p:sldId id="271" r:id="rId17"/>
-    <p:sldId id="264" r:id="rId18"/>
-    <p:sldId id="266" r:id="rId19"/>
-    <p:sldId id="265" r:id="rId20"/>
-    <p:sldId id="268" r:id="rId21"/>
-    <p:sldId id="267" r:id="rId22"/>
-    <p:sldId id="269" r:id="rId23"/>
+    <p:sldId id="272" r:id="rId14"/>
+    <p:sldId id="270" r:id="rId15"/>
+    <p:sldId id="263" r:id="rId16"/>
+    <p:sldId id="260" r:id="rId17"/>
+    <p:sldId id="271" r:id="rId18"/>
+    <p:sldId id="264" r:id="rId19"/>
+    <p:sldId id="266" r:id="rId20"/>
+    <p:sldId id="265" r:id="rId21"/>
+    <p:sldId id="268" r:id="rId22"/>
+    <p:sldId id="267" r:id="rId23"/>
+    <p:sldId id="269" r:id="rId24"/>
   </p:sldIdLst>
   <p:sldSz cx="18288000" cy="10287000"/>
   <p:notesSz cx="6858000" cy="9144000"/>
@@ -168,6 +169,7 @@
             <p14:sldId id="262"/>
             <p14:sldId id="257"/>
             <p14:sldId id="261"/>
+            <p14:sldId id="272"/>
             <p14:sldId id="270"/>
             <p14:sldId id="263"/>
             <p14:sldId id="260"/>
@@ -282,7 +284,7 @@
           <a:p>
             <a:fld id="{3B38BBD5-A164-49D8-82A5-B89DF7EB960D}" type="datetimeFigureOut">
               <a:rPr lang="en-US" smtClean="0"/>
-              <a:t>11/13/2021</a:t>
+              <a:t>11/21/2021</a:t>
             </a:fld>
             <a:endParaRPr lang="en-US"/>
           </a:p>
@@ -698,7 +700,7 @@
           <a:p>
             <a:fld id="{6E18B3A6-8122-4EEA-86F9-029B06D72AE0}" type="slidenum">
               <a:rPr lang="en-US" smtClean="0"/>
-              <a:t>12</a:t>
+              <a:t>13</a:t>
             </a:fld>
             <a:endParaRPr lang="en-US"/>
           </a:p>
@@ -8625,6 +8627,154 @@
 <file path=ppt/slides/slide10.xml><?xml version="1.0" encoding="utf-8"?>
 <p:sld xmlns:a="http://schemas.openxmlformats.org/drawingml/2006/main" xmlns:r="http://schemas.openxmlformats.org/officeDocument/2006/relationships" xmlns:p="http://schemas.openxmlformats.org/presentationml/2006/main">
   <p:cSld>
+    <p:spTree>
+      <p:nvGrpSpPr>
+        <p:cNvPr id="1" name=""/>
+        <p:cNvGrpSpPr/>
+        <p:nvPr/>
+      </p:nvGrpSpPr>
+      <p:grpSpPr>
+        <a:xfrm>
+          <a:off x="0" y="0"/>
+          <a:ext cx="0" cy="0"/>
+          <a:chOff x="0" y="0"/>
+          <a:chExt cx="0" cy="0"/>
+        </a:xfrm>
+      </p:grpSpPr>
+      <p:sp>
+        <p:nvSpPr>
+          <p:cNvPr id="14" name="Title 13">
+            <a:extLst>
+              <a:ext uri="{FF2B5EF4-FFF2-40B4-BE49-F238E27FC236}">
+                <a16:creationId xmlns:a16="http://schemas.microsoft.com/office/drawing/2014/main" id="{40CAEEE8-1C27-46F9-8866-53F8378E13EB}"/>
+              </a:ext>
+            </a:extLst>
+          </p:cNvPr>
+          <p:cNvSpPr>
+            <a:spLocks noGrp="1"/>
+          </p:cNvSpPr>
+          <p:nvPr>
+            <p:ph type="title"/>
+          </p:nvPr>
+        </p:nvSpPr>
+        <p:spPr>
+          <a:xfrm>
+            <a:off x="987651" y="1050339"/>
+            <a:ext cx="6985416" cy="1666735"/>
+          </a:xfrm>
+        </p:spPr>
+        <p:txBody>
+          <a:bodyPr/>
+          <a:lstStyle/>
+          <a:p>
+            <a:r>
+              <a:rPr lang="en-US" sz="6000" dirty="0"/>
+              <a:t>Episode and Steps</a:t>
+            </a:r>
+          </a:p>
+        </p:txBody>
+      </p:sp>
+      <p:sp>
+        <p:nvSpPr>
+          <p:cNvPr id="15" name="Text Placeholder 14">
+            <a:extLst>
+              <a:ext uri="{FF2B5EF4-FFF2-40B4-BE49-F238E27FC236}">
+                <a16:creationId xmlns:a16="http://schemas.microsoft.com/office/drawing/2014/main" id="{EDB679B2-01F7-49A9-9AB4-77303BEE02FD}"/>
+              </a:ext>
+            </a:extLst>
+          </p:cNvPr>
+          <p:cNvSpPr>
+            <a:spLocks noGrp="1"/>
+          </p:cNvSpPr>
+          <p:nvPr>
+            <p:ph type="body" sz="quarter" idx="10"/>
+          </p:nvPr>
+        </p:nvSpPr>
+        <p:spPr>
+          <a:xfrm>
+            <a:off x="883148" y="2887739"/>
+            <a:ext cx="6985416" cy="5106730"/>
+          </a:xfrm>
+        </p:spPr>
+        <p:txBody>
+          <a:bodyPr/>
+          <a:lstStyle/>
+          <a:p>
+            <a:pPr marL="685800" indent="-685800">
+              <a:buFont typeface="Arial" panose="020B0604020202020204" pitchFamily="34" charset="0"/>
+              <a:buChar char="•"/>
+            </a:pPr>
+            <a:r>
+              <a:rPr lang="en-US" sz="4200" dirty="0"/>
+              <a:t>An episode is defined as going until the snake dies</a:t>
+            </a:r>
+          </a:p>
+          <a:p>
+            <a:pPr marL="685800" indent="-685800">
+              <a:buFont typeface="Arial" panose="020B0604020202020204" pitchFamily="34" charset="0"/>
+              <a:buChar char="•"/>
+            </a:pPr>
+            <a:r>
+              <a:rPr lang="en-US" sz="4200" dirty="0"/>
+              <a:t>Since episodes can get very large, the number of steps will be limited to 5,000</a:t>
+            </a:r>
+          </a:p>
+          <a:p>
+            <a:pPr marL="685800" indent="-685800">
+              <a:buFont typeface="Arial" panose="020B0604020202020204" pitchFamily="34" charset="0"/>
+              <a:buChar char="•"/>
+            </a:pPr>
+            <a:r>
+              <a:rPr lang="en-US" sz="4200" dirty="0"/>
+              <a:t>Variable number of episodes will be tried for training</a:t>
+            </a:r>
+          </a:p>
+        </p:txBody>
+      </p:sp>
+      <p:pic>
+        <p:nvPicPr>
+          <p:cNvPr id="19" name="Picture Placeholder 18">
+            <a:extLst>
+              <a:ext uri="{FF2B5EF4-FFF2-40B4-BE49-F238E27FC236}">
+                <a16:creationId xmlns:a16="http://schemas.microsoft.com/office/drawing/2014/main" id="{D6B0F15E-4CF1-4925-8236-D7CF8B747FB8}"/>
+              </a:ext>
+            </a:extLst>
+          </p:cNvPr>
+          <p:cNvPicPr>
+            <a:picLocks noGrp="1" noChangeAspect="1"/>
+          </p:cNvPicPr>
+          <p:nvPr>
+            <p:ph type="pic" sz="quarter" idx="15"/>
+          </p:nvPr>
+        </p:nvPicPr>
+        <p:blipFill rotWithShape="1">
+          <a:blip r:embed="rId2"/>
+          <a:srcRect l="239" t="-5851" b="-5851"/>
+          <a:stretch/>
+        </p:blipFill>
+        <p:spPr>
+          <a:xfrm>
+            <a:off x="9144000" y="0"/>
+            <a:ext cx="9144000" cy="10287000"/>
+          </a:xfrm>
+        </p:spPr>
+      </p:pic>
+    </p:spTree>
+    <p:extLst>
+      <p:ext uri="{BB962C8B-B14F-4D97-AF65-F5344CB8AC3E}">
+        <p14:creationId xmlns:p14="http://schemas.microsoft.com/office/powerpoint/2010/main" val="1342404109"/>
+      </p:ext>
+    </p:extLst>
+  </p:cSld>
+  <p:clrMapOvr>
+    <a:masterClrMapping/>
+  </p:clrMapOvr>
+</p:sld>
+</file>
+
+<file path=ppt/slides/slide11.xml><?xml version="1.0" encoding="utf-8"?>
+<p:sld xmlns:a="http://schemas.openxmlformats.org/drawingml/2006/main" xmlns:r="http://schemas.openxmlformats.org/officeDocument/2006/relationships" xmlns:p="http://schemas.openxmlformats.org/presentationml/2006/main">
+  <p:cSld>
     <p:bg>
       <p:bgPr>
         <a:solidFill>
@@ -8677,108 +8827,235 @@
           </a:p>
         </p:txBody>
       </p:sp>
-      <p:sp>
-        <p:nvSpPr>
-          <p:cNvPr id="8" name="Text Placeholder 7">
-            <a:extLst>
-              <a:ext uri="{FF2B5EF4-FFF2-40B4-BE49-F238E27FC236}">
-                <a16:creationId xmlns:a16="http://schemas.microsoft.com/office/drawing/2014/main" id="{34E74C59-03C9-40F7-9F95-98EBE7F9989C}"/>
-              </a:ext>
-            </a:extLst>
-          </p:cNvPr>
-          <p:cNvSpPr>
-            <a:spLocks noGrp="1"/>
-          </p:cNvSpPr>
-          <p:nvPr>
-            <p:ph type="body" sz="quarter" idx="10"/>
-          </p:nvPr>
-        </p:nvSpPr>
-        <p:spPr>
-          <a:xfrm>
-            <a:off x="759558" y="2971113"/>
-            <a:ext cx="15369267" cy="5513173"/>
-          </a:xfrm>
-        </p:spPr>
-        <p:txBody>
-          <a:bodyPr/>
-          <a:lstStyle/>
-          <a:p>
-            <a:pPr marL="685800" indent="-685800">
-              <a:buFont typeface="Arial" panose="020B0604020202020204" pitchFamily="34" charset="0"/>
-              <a:buChar char="•"/>
-            </a:pPr>
-            <a:r>
-              <a:rPr lang="en-US" sz="3600" dirty="0"/>
-              <a:t>Even with the growing state space size, </a:t>
-            </a:r>
-            <a:r>
-              <a:rPr lang="en-US" sz="3600" i="1" dirty="0"/>
-              <a:t>it could </a:t>
-            </a:r>
-            <a:r>
-              <a:rPr lang="en-US" sz="3600" dirty="0"/>
-              <a:t>be stored in memory and tabular methods might work.</a:t>
-            </a:r>
-          </a:p>
-          <a:p>
-            <a:pPr marL="2171576" lvl="1" indent="-685800">
-              <a:buFont typeface="Arial" panose="020B0604020202020204" pitchFamily="34" charset="0"/>
-              <a:buChar char="•"/>
-            </a:pPr>
-            <a:r>
-              <a:rPr lang="en-US" sz="3000" dirty="0">
-                <a:solidFill>
-                  <a:schemeClr val="bg1"/>
-                </a:solidFill>
-              </a:rPr>
-              <a:t>But the state space changes every time we gain a food piece. Furthermore, the food piece is placed randomly</a:t>
-            </a:r>
-          </a:p>
-          <a:p>
-            <a:pPr marL="2171576" lvl="1" indent="-685800">
-              <a:buFont typeface="Arial" panose="020B0604020202020204" pitchFamily="34" charset="0"/>
-              <a:buChar char="•"/>
-            </a:pPr>
-            <a:r>
-              <a:rPr lang="en-US" sz="3000" dirty="0">
-                <a:solidFill>
-                  <a:schemeClr val="bg1"/>
-                </a:solidFill>
-              </a:rPr>
-              <a:t>Scaling the problem to say a 100x100 grid, or adding “opponent” snakes would require a new algorithm</a:t>
-            </a:r>
-          </a:p>
-          <a:p>
-            <a:pPr marL="685800" indent="-685800">
-              <a:buFont typeface="Arial" panose="020B0604020202020204" pitchFamily="34" charset="0"/>
-              <a:buChar char="•"/>
-            </a:pPr>
-            <a:r>
-              <a:rPr lang="en-US" sz="3600" b="1" dirty="0"/>
-              <a:t>Deep Q-Learning (DQN) </a:t>
-            </a:r>
-            <a:r>
-              <a:rPr lang="en-US" sz="3600" dirty="0"/>
-              <a:t>can help with stochasticity and handle large state space</a:t>
-            </a:r>
-          </a:p>
-          <a:p>
-            <a:pPr marL="685800" indent="-685800">
-              <a:buFont typeface="Arial" panose="020B0604020202020204" pitchFamily="34" charset="0"/>
-              <a:buChar char="•"/>
-            </a:pPr>
-            <a:r>
-              <a:rPr lang="en-US" sz="3600" b="1" dirty="0"/>
-              <a:t>Replay Buffer </a:t>
-            </a:r>
-            <a:r>
-              <a:rPr lang="en-US" sz="3600" dirty="0"/>
-              <a:t>will be used to promote independent-identical distribution (IID)</a:t>
-            </a:r>
-            <a:endParaRPr lang="en-US" sz="3600" b="1" dirty="0"/>
-          </a:p>
-        </p:txBody>
-      </p:sp>
+      <mc:AlternateContent xmlns:mc="http://schemas.openxmlformats.org/markup-compatibility/2006">
+        <mc:Choice xmlns:a14="http://schemas.microsoft.com/office/drawing/2010/main" Requires="a14">
+          <p:sp>
+            <p:nvSpPr>
+              <p:cNvPr id="8" name="Text Placeholder 7">
+                <a:extLst>
+                  <a:ext uri="{FF2B5EF4-FFF2-40B4-BE49-F238E27FC236}">
+                    <a16:creationId xmlns:a16="http://schemas.microsoft.com/office/drawing/2014/main" id="{34E74C59-03C9-40F7-9F95-98EBE7F9989C}"/>
+                  </a:ext>
+                </a:extLst>
+              </p:cNvPr>
+              <p:cNvSpPr>
+                <a:spLocks noGrp="1"/>
+              </p:cNvSpPr>
+              <p:nvPr>
+                <p:ph type="body" sz="quarter" idx="10"/>
+              </p:nvPr>
+            </p:nvSpPr>
+            <p:spPr>
+              <a:xfrm>
+                <a:off x="759558" y="2971113"/>
+                <a:ext cx="15369267" cy="5513173"/>
+              </a:xfrm>
+            </p:spPr>
+            <p:txBody>
+              <a:bodyPr/>
+              <a:lstStyle/>
+              <a:p>
+                <a:pPr marL="685800" indent="-685800">
+                  <a:buFont typeface="Arial" panose="020B0604020202020204" pitchFamily="34" charset="0"/>
+                  <a:buChar char="•"/>
+                </a:pPr>
+                <a:r>
+                  <a:rPr lang="en-US" sz="3600" dirty="0"/>
+                  <a:t>State space is </a:t>
+                </a:r>
+                <a14:m>
+                  <m:oMath xmlns:m="http://schemas.openxmlformats.org/officeDocument/2006/math">
+                    <m:sSup>
+                      <m:sSupPr>
+                        <m:ctrlPr>
+                          <a:rPr lang="en-US" sz="3600" b="0" i="1" smtClean="0">
+                            <a:latin typeface="Cambria Math" panose="02040503050406030204" pitchFamily="18" charset="0"/>
+                          </a:rPr>
+                        </m:ctrlPr>
+                      </m:sSupPr>
+                      <m:e>
+                        <m:r>
+                          <a:rPr lang="en-US" sz="3600" b="0" i="1" smtClean="0">
+                            <a:latin typeface="Cambria Math" panose="02040503050406030204" pitchFamily="18" charset="0"/>
+                          </a:rPr>
+                          <m:t>2</m:t>
+                        </m:r>
+                      </m:e>
+                      <m:sup>
+                        <m:r>
+                          <a:rPr lang="en-US" sz="3600" b="0" i="1" smtClean="0">
+                            <a:latin typeface="Cambria Math" panose="02040503050406030204" pitchFamily="18" charset="0"/>
+                          </a:rPr>
+                          <m:t>16</m:t>
+                        </m:r>
+                      </m:sup>
+                    </m:sSup>
+                    <m:r>
+                      <a:rPr lang="en-US" sz="3600" b="0" i="1" smtClean="0">
+                        <a:latin typeface="Cambria Math" panose="02040503050406030204" pitchFamily="18" charset="0"/>
+                      </a:rPr>
+                      <m:t>∗</m:t>
+                    </m:r>
+                    <m:r>
+                      <a:rPr lang="en-US" sz="3600" b="0" i="1" smtClean="0">
+                        <a:latin typeface="Cambria Math" panose="02040503050406030204" pitchFamily="18" charset="0"/>
+                      </a:rPr>
+                      <m:t>𝑔𝑟𝑖</m:t>
+                    </m:r>
+                    <m:sSubSup>
+                      <m:sSubSupPr>
+                        <m:ctrlPr>
+                          <a:rPr lang="en-US" sz="3600" b="0" i="1" smtClean="0">
+                            <a:latin typeface="Cambria Math" panose="02040503050406030204" pitchFamily="18" charset="0"/>
+                          </a:rPr>
+                        </m:ctrlPr>
+                      </m:sSubSupPr>
+                      <m:e>
+                        <m:r>
+                          <a:rPr lang="en-US" sz="3600" b="0" i="1" smtClean="0">
+                            <a:latin typeface="Cambria Math" panose="02040503050406030204" pitchFamily="18" charset="0"/>
+                          </a:rPr>
+                          <m:t>𝑑</m:t>
+                        </m:r>
+                      </m:e>
+                      <m:sub>
+                        <m:r>
+                          <a:rPr lang="en-US" sz="3600" b="0" i="1" smtClean="0">
+                            <a:latin typeface="Cambria Math" panose="02040503050406030204" pitchFamily="18" charset="0"/>
+                          </a:rPr>
+                          <m:t>𝑠𝑖𝑧𝑒</m:t>
+                        </m:r>
+                      </m:sub>
+                      <m:sup>
+                        <m:r>
+                          <a:rPr lang="en-US" sz="3600" b="0" i="1" smtClean="0">
+                            <a:latin typeface="Cambria Math" panose="02040503050406030204" pitchFamily="18" charset="0"/>
+                          </a:rPr>
+                          <m:t>2</m:t>
+                        </m:r>
+                      </m:sup>
+                    </m:sSubSup>
+                  </m:oMath>
+                </a14:m>
+                <a:r>
+                  <a:rPr lang="en-US" sz="3600" dirty="0"/>
+                  <a:t> </a:t>
+                </a:r>
+              </a:p>
+              <a:p>
+                <a:pPr marL="2171576" lvl="1" indent="-685800">
+                  <a:buFont typeface="Arial" panose="020B0604020202020204" pitchFamily="34" charset="0"/>
+                  <a:buChar char="•"/>
+                </a:pPr>
+                <a:r>
+                  <a:rPr lang="en-US" sz="3000" dirty="0">
+                    <a:solidFill>
+                      <a:schemeClr val="bg1"/>
+                    </a:solidFill>
+                  </a:rPr>
+                  <a:t>For 30x30 grid, state space is around 39,321,600 states</a:t>
+                </a:r>
+              </a:p>
+              <a:p>
+                <a:pPr marL="2171576" lvl="1" indent="-685800">
+                  <a:buFont typeface="Arial" panose="020B0604020202020204" pitchFamily="34" charset="0"/>
+                  <a:buChar char="•"/>
+                </a:pPr>
+                <a:r>
+                  <a:rPr lang="en-US" sz="3000" dirty="0">
+                    <a:solidFill>
+                      <a:schemeClr val="bg1"/>
+                    </a:solidFill>
+                  </a:rPr>
+                  <a:t>Stochasticity of reward placement, body growing, and large state size means tabular methods will not scale</a:t>
+                </a:r>
+              </a:p>
+              <a:p>
+                <a:pPr marL="685800" indent="-685800">
+                  <a:buFont typeface="Arial" panose="020B0604020202020204" pitchFamily="34" charset="0"/>
+                  <a:buChar char="•"/>
+                </a:pPr>
+                <a:r>
+                  <a:rPr lang="en-US" sz="3600" dirty="0"/>
+                  <a:t>Function value approximation can handle large state space. </a:t>
+                </a:r>
+              </a:p>
+              <a:p>
+                <a:pPr marL="685800" indent="-685800">
+                  <a:buFont typeface="Arial" panose="020B0604020202020204" pitchFamily="34" charset="0"/>
+                  <a:buChar char="•"/>
+                </a:pPr>
+                <a:r>
+                  <a:rPr lang="en-US" sz="3600" b="1" dirty="0"/>
+                  <a:t>Deep Q-Learning (DQN) </a:t>
+                </a:r>
+                <a:r>
+                  <a:rPr lang="en-US" sz="3600" dirty="0"/>
+                  <a:t>will allow for non-linear estimation and handle stochasticity of environment</a:t>
+                </a:r>
+              </a:p>
+              <a:p>
+                <a:pPr marL="685800" indent="-685800">
+                  <a:buFont typeface="Arial" panose="020B0604020202020204" pitchFamily="34" charset="0"/>
+                  <a:buChar char="•"/>
+                </a:pPr>
+                <a:r>
+                  <a:rPr lang="en-US" sz="3600" b="1" dirty="0"/>
+                  <a:t>Replay Buffer </a:t>
+                </a:r>
+                <a:r>
+                  <a:rPr lang="en-US" sz="3600" dirty="0"/>
+                  <a:t>will be used to promote independent-identical distribution (IID)</a:t>
+                </a:r>
+                <a:endParaRPr lang="en-US" sz="3600" b="1" dirty="0"/>
+              </a:p>
+            </p:txBody>
+          </p:sp>
+        </mc:Choice>
+        <mc:Fallback>
+          <p:sp>
+            <p:nvSpPr>
+              <p:cNvPr id="8" name="Text Placeholder 7">
+                <a:extLst>
+                  <a:ext uri="{FF2B5EF4-FFF2-40B4-BE49-F238E27FC236}">
+                    <a16:creationId xmlns:a16="http://schemas.microsoft.com/office/drawing/2014/main" id="{34E74C59-03C9-40F7-9F95-98EBE7F9989C}"/>
+                  </a:ext>
+                </a:extLst>
+              </p:cNvPr>
+              <p:cNvSpPr>
+                <a:spLocks noGrp="1" noRot="1" noChangeAspect="1" noMove="1" noResize="1" noEditPoints="1" noAdjustHandles="1" noChangeArrowheads="1" noChangeShapeType="1" noTextEdit="1"/>
+              </p:cNvSpPr>
+              <p:nvPr>
+                <p:ph type="body" sz="quarter" idx="10"/>
+              </p:nvPr>
+            </p:nvSpPr>
+            <p:spPr>
+              <a:xfrm>
+                <a:off x="759558" y="2971113"/>
+                <a:ext cx="15369267" cy="5513173"/>
+              </a:xfrm>
+              <a:blipFill>
+                <a:blip r:embed="rId2"/>
+                <a:stretch>
+                  <a:fillRect l="-1706" t="-2983" r="-516"/>
+                </a:stretch>
+              </a:blipFill>
+            </p:spPr>
+            <p:txBody>
+              <a:bodyPr/>
+              <a:lstStyle/>
+              <a:p>
+                <a:r>
+                  <a:rPr lang="en-US">
+                    <a:noFill/>
+                  </a:rPr>
+                  <a:t> </a:t>
+                </a:r>
+              </a:p>
+            </p:txBody>
+          </p:sp>
+        </mc:Fallback>
+      </mc:AlternateContent>
     </p:spTree>
     <p:extLst>
       <p:ext uri="{BB962C8B-B14F-4D97-AF65-F5344CB8AC3E}">
@@ -8792,7 +9069,7 @@
 </p:sld>
 </file>
 
-<file path=ppt/slides/slide11.xml><?xml version="1.0" encoding="utf-8"?>
+<file path=ppt/slides/slide12.xml><?xml version="1.0" encoding="utf-8"?>
 <p:sld xmlns:a="http://schemas.openxmlformats.org/drawingml/2006/main" xmlns:r="http://schemas.openxmlformats.org/officeDocument/2006/relationships" xmlns:p="http://schemas.openxmlformats.org/presentationml/2006/main">
   <p:cSld>
     <p:spTree>
@@ -10199,7 +10476,7 @@
 </p:sld>
 </file>
 
-<file path=ppt/slides/slide12.xml><?xml version="1.0" encoding="utf-8"?>
+<file path=ppt/slides/slide13.xml><?xml version="1.0" encoding="utf-8"?>
 <p:sld xmlns:a="http://schemas.openxmlformats.org/drawingml/2006/main" xmlns:r="http://schemas.openxmlformats.org/officeDocument/2006/relationships" xmlns:p="http://schemas.openxmlformats.org/presentationml/2006/main">
   <p:cSld>
     <p:spTree>
@@ -10822,42 +11099,6 @@
             <a:r>
               <a:rPr lang="en-US" dirty="0" err="1"/>
               <a:t>food_left</a:t>
-            </a:r>
-            <a:endParaRPr lang="en-US" dirty="0"/>
-          </a:p>
-        </p:txBody>
-      </p:sp>
-      <p:sp>
-        <p:nvSpPr>
-          <p:cNvPr id="25" name="TextBox 24">
-            <a:extLst>
-              <a:ext uri="{FF2B5EF4-FFF2-40B4-BE49-F238E27FC236}">
-                <a16:creationId xmlns:a16="http://schemas.microsoft.com/office/drawing/2014/main" id="{2A14512A-F9AB-4371-BCDA-D65758B31582}"/>
-              </a:ext>
-            </a:extLst>
-          </p:cNvPr>
-          <p:cNvSpPr txBox="1"/>
-          <p:nvPr/>
-        </p:nvSpPr>
-        <p:spPr>
-          <a:xfrm>
-            <a:off x="6631464" y="8458225"/>
-            <a:ext cx="1181157" cy="369332"/>
-          </a:xfrm>
-          <a:prstGeom prst="rect">
-            <a:avLst/>
-          </a:prstGeom>
-          <a:noFill/>
-        </p:spPr>
-        <p:txBody>
-          <a:bodyPr wrap="none" rtlCol="0">
-            <a:spAutoFit/>
-          </a:bodyPr>
-          <a:lstStyle/>
-          <a:p>
-            <a:r>
-              <a:rPr lang="en-US" dirty="0" err="1"/>
-              <a:t>distance_x</a:t>
             </a:r>
             <a:endParaRPr lang="en-US" dirty="0"/>
           </a:p>
@@ -11015,8 +11256,8 @@
         </p:nvSpPr>
         <p:spPr>
           <a:xfrm>
-            <a:off x="6619812" y="9103029"/>
-            <a:ext cx="1185966" cy="369332"/>
+            <a:off x="6381675" y="8384828"/>
+            <a:ext cx="1364220" cy="369332"/>
           </a:xfrm>
           <a:prstGeom prst="rect">
             <a:avLst/>
@@ -11031,7 +11272,7 @@
           <a:p>
             <a:r>
               <a:rPr lang="en-US" dirty="0" err="1"/>
-              <a:t>distance_y</a:t>
+              <a:t>body_length</a:t>
             </a:r>
             <a:endParaRPr lang="en-US" dirty="0"/>
           </a:p>
@@ -11225,8 +11466,8 @@
           </a:fontRef>
         </p:style>
       </p:cxnSp>
-      <mc:AlternateContent xmlns:mc="http://schemas.openxmlformats.org/markup-compatibility/2006">
-        <mc:Choice xmlns:a14="http://schemas.microsoft.com/office/drawing/2010/main" Requires="a14">
+      <mc:AlternateContent xmlns:mc="http://schemas.openxmlformats.org/markup-compatibility/2006" xmlns:a14="http://schemas.microsoft.com/office/drawing/2010/main">
+        <mc:Choice Requires="a14">
           <p:sp>
             <p:nvSpPr>
               <p:cNvPr id="43" name="TextBox 42">
@@ -11609,7 +11850,7 @@
             </p:txBody>
           </p:sp>
         </mc:Choice>
-        <mc:Fallback>
+        <mc:Fallback xmlns="">
           <p:sp>
             <p:nvSpPr>
               <p:cNvPr id="43" name="TextBox 42">
@@ -11654,8 +11895,8 @@
           </p:sp>
         </mc:Fallback>
       </mc:AlternateContent>
-      <mc:AlternateContent xmlns:mc="http://schemas.openxmlformats.org/markup-compatibility/2006">
-        <mc:Choice xmlns:a14="http://schemas.microsoft.com/office/drawing/2010/main" Requires="a14">
+      <mc:AlternateContent xmlns:mc="http://schemas.openxmlformats.org/markup-compatibility/2006" xmlns:a14="http://schemas.microsoft.com/office/drawing/2010/main">
+        <mc:Choice Requires="a14">
           <p:sp>
             <p:nvSpPr>
               <p:cNvPr id="49" name="TextBox 48">
@@ -11786,7 +12027,7 @@
             </p:txBody>
           </p:sp>
         </mc:Choice>
-        <mc:Fallback>
+        <mc:Fallback xmlns="">
           <p:sp>
             <p:nvSpPr>
               <p:cNvPr id="49" name="TextBox 48">
@@ -11831,8 +12072,8 @@
           </p:sp>
         </mc:Fallback>
       </mc:AlternateContent>
-      <mc:AlternateContent xmlns:mc="http://schemas.openxmlformats.org/markup-compatibility/2006">
-        <mc:Choice xmlns:a14="http://schemas.microsoft.com/office/drawing/2010/main" Requires="a14">
+      <mc:AlternateContent xmlns:mc="http://schemas.openxmlformats.org/markup-compatibility/2006" xmlns:a14="http://schemas.microsoft.com/office/drawing/2010/main">
+        <mc:Choice Requires="a14">
           <p:sp>
             <p:nvSpPr>
               <p:cNvPr id="32" name="TextBox 31">
@@ -12186,7 +12427,7 @@
             </p:txBody>
           </p:sp>
         </mc:Choice>
-        <mc:Fallback>
+        <mc:Fallback xmlns="">
           <p:sp>
             <p:nvSpPr>
               <p:cNvPr id="32" name="TextBox 31">
@@ -12314,6 +12555,41 @@
           </a:fontRef>
         </p:style>
       </p:cxnSp>
+      <p:sp>
+        <p:nvSpPr>
+          <p:cNvPr id="36" name="TextBox 35">
+            <a:extLst>
+              <a:ext uri="{FF2B5EF4-FFF2-40B4-BE49-F238E27FC236}">
+                <a16:creationId xmlns:a16="http://schemas.microsoft.com/office/drawing/2014/main" id="{42E190C6-E93B-4593-B400-63FA8D66B024}"/>
+              </a:ext>
+            </a:extLst>
+          </p:cNvPr>
+          <p:cNvSpPr txBox="1"/>
+          <p:nvPr/>
+        </p:nvSpPr>
+        <p:spPr>
+          <a:xfrm>
+            <a:off x="7254949" y="9048838"/>
+            <a:ext cx="724577" cy="369332"/>
+          </a:xfrm>
+          <a:prstGeom prst="rect">
+            <a:avLst/>
+          </a:prstGeom>
+          <a:noFill/>
+        </p:spPr>
+        <p:txBody>
+          <a:bodyPr wrap="square" rtlCol="0">
+            <a:spAutoFit/>
+          </a:bodyPr>
+          <a:lstStyle/>
+          <a:p>
+            <a:r>
+              <a:rPr lang="en-US" dirty="0"/>
+              <a:t>…</a:t>
+            </a:r>
+          </a:p>
+        </p:txBody>
+      </p:sp>
     </p:spTree>
     <p:extLst>
       <p:ext uri="{BB962C8B-B14F-4D97-AF65-F5344CB8AC3E}">
@@ -12327,7 +12603,7 @@
 </p:sld>
 </file>
 
-<file path=ppt/slides/slide13.xml><?xml version="1.0" encoding="utf-8"?>
+<file path=ppt/slides/slide14.xml><?xml version="1.0" encoding="utf-8"?>
 <p:sld xmlns:a="http://schemas.openxmlformats.org/drawingml/2006/main" xmlns:r="http://schemas.openxmlformats.org/officeDocument/2006/relationships" xmlns:p="http://schemas.openxmlformats.org/presentationml/2006/main">
   <p:cSld>
     <p:spTree>
@@ -12568,8 +12844,8 @@
           </a:p>
         </p:txBody>
       </p:sp>
-      <mc:AlternateContent xmlns:mc="http://schemas.openxmlformats.org/markup-compatibility/2006">
-        <mc:Choice xmlns:a14="http://schemas.microsoft.com/office/drawing/2010/main" Requires="a14">
+      <mc:AlternateContent xmlns:mc="http://schemas.openxmlformats.org/markup-compatibility/2006" xmlns:a14="http://schemas.microsoft.com/office/drawing/2010/main">
+        <mc:Choice Requires="a14">
           <p:sp>
             <p:nvSpPr>
               <p:cNvPr id="11" name="Text Placeholder 7">
@@ -13520,7 +13796,7 @@
                                 <m:sSup>
                                   <m:sSupPr>
                                     <m:ctrlPr>
-                                      <a:rPr lang="en-US" sz="3000" b="0" i="0" smtClean="0">
+                                      <a:rPr lang="en-US" sz="3000" b="0" i="1" smtClean="0">
                                         <a:solidFill>
                                           <a:schemeClr val="bg1"/>
                                         </a:solidFill>
@@ -13636,7 +13912,7 @@
             </p:txBody>
           </p:sp>
         </mc:Choice>
-        <mc:Fallback>
+        <mc:Fallback xmlns="">
           <p:sp>
             <p:nvSpPr>
               <p:cNvPr id="11" name="Text Placeholder 7">
@@ -13694,7 +13970,7 @@
 </p:sld>
 </file>
 
-<file path=ppt/slides/slide14.xml><?xml version="1.0" encoding="utf-8"?>
+<file path=ppt/slides/slide15.xml><?xml version="1.0" encoding="utf-8"?>
 <p:sld xmlns:a="http://schemas.openxmlformats.org/drawingml/2006/main" xmlns:r="http://schemas.openxmlformats.org/officeDocument/2006/relationships" xmlns:p="http://schemas.openxmlformats.org/presentationml/2006/main">
   <p:cSld>
     <p:spTree>
@@ -13935,8 +14211,8 @@
           </a:p>
         </p:txBody>
       </p:sp>
-      <mc:AlternateContent xmlns:mc="http://schemas.openxmlformats.org/markup-compatibility/2006">
-        <mc:Choice xmlns:a14="http://schemas.microsoft.com/office/drawing/2010/main" Requires="a14">
+      <mc:AlternateContent xmlns:mc="http://schemas.openxmlformats.org/markup-compatibility/2006" xmlns:a14="http://schemas.microsoft.com/office/drawing/2010/main">
+        <mc:Choice Requires="a14">
           <p:sp>
             <p:nvSpPr>
               <p:cNvPr id="11" name="Text Placeholder 7">
@@ -14240,7 +14516,7 @@
             </p:txBody>
           </p:sp>
         </mc:Choice>
-        <mc:Fallback>
+        <mc:Fallback xmlns="">
           <p:sp>
             <p:nvSpPr>
               <p:cNvPr id="11" name="Text Placeholder 7">
@@ -14298,7 +14574,7 @@
 </p:sld>
 </file>
 
-<file path=ppt/slides/slide15.xml><?xml version="1.0" encoding="utf-8"?>
+<file path=ppt/slides/slide16.xml><?xml version="1.0" encoding="utf-8"?>
 <p:sld xmlns:a="http://schemas.openxmlformats.org/drawingml/2006/main" xmlns:r="http://schemas.openxmlformats.org/officeDocument/2006/relationships" xmlns:p="http://schemas.openxmlformats.org/presentationml/2006/main">
   <p:cSld>
     <p:spTree>
@@ -15356,16 +15632,6 @@
               <a:t>Terminal is wall or body</a:t>
             </a:r>
           </a:p>
-          <a:p>
-            <a:pPr marL="685800" indent="-685800">
-              <a:buFont typeface="Arial" panose="020B0604020202020204" pitchFamily="34" charset="0"/>
-              <a:buChar char="•"/>
-            </a:pPr>
-            <a:r>
-              <a:rPr lang="en-US" sz="3600" dirty="0"/>
-              <a:t>But this can quickly explode the state size, with a single snake head on a 30x30 grid and 4 ways to enter a cell, there are 3600 states. Every additional tail piece will change the state space.</a:t>
-            </a:r>
-          </a:p>
         </p:txBody>
       </p:sp>
       <p:pic>
@@ -15565,190 +15831,12 @@
                 </a:pPr>
                 <a:r>
                   <a:rPr lang="en-US" sz="3000" b="1" dirty="0"/>
-                  <a:t>Distance From Food: </a:t>
+                  <a:t>Direction of Food: </a:t>
                 </a:r>
                 <a:r>
                   <a:rPr lang="en-US" sz="3000" dirty="0"/>
-                  <a:t>Distance to the goal is simply </a:t>
+                  <a:t>Food direction in relation to the head, marked as 0 or 1</a:t>
                 </a:r>
-                <a14:m>
-                  <m:oMath xmlns:m="http://schemas.openxmlformats.org/officeDocument/2006/math">
-                    <m:r>
-                      <a:rPr lang="x-IV_mathan" sz="3000" smtClean="0">
-                        <a:effectLst/>
-                        <a:latin typeface="Cambria Math" panose="02040503050406030204" pitchFamily="18" charset="0"/>
-                      </a:rPr>
-                      <m:t>𝑓𝑜𝑜</m:t>
-                    </m:r>
-                    <m:sSub>
-                      <m:sSubPr>
-                        <m:ctrlPr>
-                          <a:rPr lang="x-IV_mathan" sz="3000" i="1">
-                            <a:effectLst/>
-                            <a:latin typeface="Cambria Math" panose="02040503050406030204" pitchFamily="18" charset="0"/>
-                          </a:rPr>
-                        </m:ctrlPr>
-                      </m:sSubPr>
-                      <m:e>
-                        <m:r>
-                          <a:rPr lang="x-IV_mathan" sz="3000">
-                            <a:effectLst/>
-                            <a:latin typeface="Cambria Math" panose="02040503050406030204" pitchFamily="18" charset="0"/>
-                          </a:rPr>
-                          <m:t>𝑑</m:t>
-                        </m:r>
-                      </m:e>
-                      <m:sub>
-                        <m:r>
-                          <a:rPr lang="x-IV_mathan" sz="3000">
-                            <a:effectLst/>
-                            <a:latin typeface="Cambria Math" panose="02040503050406030204" pitchFamily="18" charset="0"/>
-                          </a:rPr>
-                          <m:t>𝑦</m:t>
-                        </m:r>
-                      </m:sub>
-                    </m:sSub>
-                    <m:r>
-                      <a:rPr lang="x-IV_mathan" sz="3000">
-                        <a:effectLst/>
-                        <a:latin typeface="Cambria Math" panose="02040503050406030204" pitchFamily="18" charset="0"/>
-                      </a:rPr>
-                      <m:t>−</m:t>
-                    </m:r>
-                    <m:r>
-                      <a:rPr lang="x-IV_mathan" sz="3000" i="1">
-                        <a:effectLst/>
-                        <a:latin typeface="Cambria Math" panose="02040503050406030204" pitchFamily="18" charset="0"/>
-                      </a:rPr>
-                      <m:t>h</m:t>
-                    </m:r>
-                    <m:r>
-                      <a:rPr lang="x-IV_mathan" sz="3000">
-                        <a:effectLst/>
-                        <a:latin typeface="Cambria Math" panose="02040503050406030204" pitchFamily="18" charset="0"/>
-                      </a:rPr>
-                      <m:t>𝑒𝑎</m:t>
-                    </m:r>
-                    <m:sSub>
-                      <m:sSubPr>
-                        <m:ctrlPr>
-                          <a:rPr lang="x-IV_mathan" sz="3000" i="1">
-                            <a:effectLst/>
-                            <a:latin typeface="Cambria Math" panose="02040503050406030204" pitchFamily="18" charset="0"/>
-                          </a:rPr>
-                        </m:ctrlPr>
-                      </m:sSubPr>
-                      <m:e>
-                        <m:r>
-                          <a:rPr lang="x-IV_mathan" sz="3000">
-                            <a:effectLst/>
-                            <a:latin typeface="Cambria Math" panose="02040503050406030204" pitchFamily="18" charset="0"/>
-                          </a:rPr>
-                          <m:t>𝑑</m:t>
-                        </m:r>
-                      </m:e>
-                      <m:sub>
-                        <m:r>
-                          <a:rPr lang="x-IV_mathan" sz="3000">
-                            <a:effectLst/>
-                            <a:latin typeface="Cambria Math" panose="02040503050406030204" pitchFamily="18" charset="0"/>
-                          </a:rPr>
-                          <m:t>𝑦</m:t>
-                        </m:r>
-                      </m:sub>
-                    </m:sSub>
-                  </m:oMath>
-                </a14:m>
-                <a:r>
-                  <a:rPr lang="x-IV_mathan" sz="3000" dirty="0">
-                    <a:effectLst/>
-                    <a:latin typeface="Cambria Math" panose="02040503050406030204" pitchFamily="18" charset="0"/>
-                  </a:rPr>
-                  <a:t> </a:t>
-                </a:r>
-                <a:r>
-                  <a:rPr lang="x-IV_mathan" sz="3000" dirty="0"/>
-                  <a:t>and</a:t>
-                </a:r>
-                <a:r>
-                  <a:rPr lang="x-IV_mathan" sz="3000" dirty="0">
-                    <a:effectLst/>
-                    <a:latin typeface="Cambria Math" panose="02040503050406030204" pitchFamily="18" charset="0"/>
-                  </a:rPr>
-                  <a:t> </a:t>
-                </a:r>
-                <a14:m>
-                  <m:oMath xmlns:m="http://schemas.openxmlformats.org/officeDocument/2006/math">
-                    <m:r>
-                      <a:rPr lang="x-IV_mathan" sz="3000" i="1">
-                        <a:latin typeface="Cambria Math" panose="02040503050406030204" pitchFamily="18" charset="0"/>
-                      </a:rPr>
-                      <m:t>𝑓𝑜𝑜</m:t>
-                    </m:r>
-                    <m:sSub>
-                      <m:sSubPr>
-                        <m:ctrlPr>
-                          <a:rPr lang="x-IV_mathan" sz="3000" i="1">
-                            <a:latin typeface="Cambria Math" panose="02040503050406030204" pitchFamily="18" charset="0"/>
-                          </a:rPr>
-                        </m:ctrlPr>
-                      </m:sSubPr>
-                      <m:e>
-                        <m:r>
-                          <a:rPr lang="x-IV_mathan" sz="3000" i="1">
-                            <a:latin typeface="Cambria Math" panose="02040503050406030204" pitchFamily="18" charset="0"/>
-                          </a:rPr>
-                          <m:t>𝑑</m:t>
-                        </m:r>
-                      </m:e>
-                      <m:sub>
-                        <m:r>
-                          <a:rPr lang="x-IV_mathan" sz="3000" i="1">
-                            <a:latin typeface="Cambria Math" panose="02040503050406030204" pitchFamily="18" charset="0"/>
-                          </a:rPr>
-                          <m:t>𝑥</m:t>
-                        </m:r>
-                      </m:sub>
-                    </m:sSub>
-                    <m:r>
-                      <a:rPr lang="x-IV_mathan" sz="3000" i="1">
-                        <a:latin typeface="Cambria Math" panose="02040503050406030204" pitchFamily="18" charset="0"/>
-                      </a:rPr>
-                      <m:t>−</m:t>
-                    </m:r>
-                    <m:r>
-                      <a:rPr lang="x-IV_mathan" sz="3000" i="1">
-                        <a:latin typeface="Cambria Math" panose="02040503050406030204" pitchFamily="18" charset="0"/>
-                      </a:rPr>
-                      <m:t>h𝑒𝑎</m:t>
-                    </m:r>
-                    <m:sSub>
-                      <m:sSubPr>
-                        <m:ctrlPr>
-                          <a:rPr lang="x-IV_mathan" sz="3000" i="1">
-                            <a:latin typeface="Cambria Math" panose="02040503050406030204" pitchFamily="18" charset="0"/>
-                          </a:rPr>
-                        </m:ctrlPr>
-                      </m:sSubPr>
-                      <m:e>
-                        <m:r>
-                          <a:rPr lang="x-IV_mathan" sz="3000" i="1">
-                            <a:latin typeface="Cambria Math" panose="02040503050406030204" pitchFamily="18" charset="0"/>
-                          </a:rPr>
-                          <m:t>𝑑</m:t>
-                        </m:r>
-                      </m:e>
-                      <m:sub>
-                        <m:r>
-                          <a:rPr lang="x-IV_mathan" sz="3000" i="1">
-                            <a:latin typeface="Cambria Math" panose="02040503050406030204" pitchFamily="18" charset="0"/>
-                          </a:rPr>
-                          <m:t>𝑥</m:t>
-                        </m:r>
-                      </m:sub>
-                    </m:sSub>
-                  </m:oMath>
-                </a14:m>
                 <a:endParaRPr lang="x-IV_mathan" sz="3000" i="1" dirty="0">
                   <a:latin typeface="Cambria Math" panose="02040503050406030204" pitchFamily="18" charset="0"/>
                 </a:endParaRPr>
@@ -15761,168 +15849,28 @@
                 <a14:m>
                   <m:oMath xmlns:m="http://schemas.openxmlformats.org/officeDocument/2006/math">
                     <m:r>
-                      <a:rPr lang="x-IV_mathan" sz="2600" smtClean="0">
-                        <a:solidFill>
-                          <a:schemeClr val="bg1"/>
-                        </a:solidFill>
-                        <a:effectLst/>
-                        <a:latin typeface="Cambria Math" panose="02040503050406030204" pitchFamily="18" charset="0"/>
-                      </a:rPr>
-                      <m:t>−</m:t>
-                    </m:r>
-                    <m:sSub>
-                      <m:sSubPr>
-                        <m:ctrlPr>
-                          <a:rPr lang="x-IV_mathan" sz="2600" i="1">
-                            <a:solidFill>
-                              <a:schemeClr val="bg1"/>
-                            </a:solidFill>
-                            <a:effectLst/>
-                            <a:latin typeface="Cambria Math" panose="02040503050406030204" pitchFamily="18" charset="0"/>
-                          </a:rPr>
-                        </m:ctrlPr>
-                      </m:sSubPr>
-                      <m:e>
-                        <m:r>
-                          <a:rPr lang="x-IV_mathan" sz="2600">
-                            <a:solidFill>
-                              <a:schemeClr val="bg1"/>
-                            </a:solidFill>
-                            <a:effectLst/>
-                            <a:latin typeface="Cambria Math" panose="02040503050406030204" pitchFamily="18" charset="0"/>
-                          </a:rPr>
-                          <m:t>𝑔</m:t>
-                        </m:r>
-                      </m:e>
-                      <m:sub>
-                        <m:r>
-                          <a:rPr lang="x-IV_mathan" sz="2600">
-                            <a:solidFill>
-                              <a:schemeClr val="bg1"/>
-                            </a:solidFill>
-                            <a:effectLst/>
-                            <a:latin typeface="Cambria Math" panose="02040503050406030204" pitchFamily="18" charset="0"/>
-                          </a:rPr>
-                          <m:t>𝑠𝑖𝑧𝑒</m:t>
-                        </m:r>
-                      </m:sub>
-                    </m:sSub>
-                    <m:r>
                       <a:rPr lang="x-IV_mathan" sz="2600">
                         <a:solidFill>
                           <a:schemeClr val="bg1"/>
                         </a:solidFill>
-                        <a:effectLst/>
                         <a:latin typeface="Cambria Math" panose="02040503050406030204" pitchFamily="18" charset="0"/>
                       </a:rPr>
-                      <m:t>≤</m:t>
+                      <m:t>𝑥</m:t>
                     </m:r>
                     <m:r>
                       <a:rPr lang="x-IV_mathan" sz="2600">
                         <a:solidFill>
                           <a:schemeClr val="bg1"/>
                         </a:solidFill>
-                        <a:effectLst/>
                         <a:latin typeface="Cambria Math" panose="02040503050406030204" pitchFamily="18" charset="0"/>
                       </a:rPr>
-                      <m:t>𝑥</m:t>
-                    </m:r>
-                    <m:r>
-                      <a:rPr lang="en-US" sz="2600" b="0" i="0" smtClean="0">
-                        <a:solidFill>
-                          <a:schemeClr val="bg1"/>
-                        </a:solidFill>
-                        <a:effectLst/>
-                        <a:latin typeface="Cambria Math" panose="02040503050406030204" pitchFamily="18" charset="0"/>
-                      </a:rPr>
-                      <m:t>, </m:t>
-                    </m:r>
-                    <m:r>
-                      <m:rPr>
-                        <m:sty m:val="p"/>
-                      </m:rPr>
-                      <a:rPr lang="en-US" sz="2600" b="0" i="0" smtClean="0">
-                        <a:solidFill>
-                          <a:schemeClr val="bg1"/>
-                        </a:solidFill>
-                        <a:effectLst/>
-                        <a:latin typeface="Cambria Math" panose="02040503050406030204" pitchFamily="18" charset="0"/>
-                      </a:rPr>
-                      <m:t>y</m:t>
-                    </m:r>
-                    <m:r>
-                      <a:rPr lang="x-IV_mathan" sz="2600">
-                        <a:solidFill>
-                          <a:schemeClr val="bg1"/>
-                        </a:solidFill>
-                        <a:effectLst/>
-                        <a:latin typeface="Cambria Math" panose="02040503050406030204" pitchFamily="18" charset="0"/>
-                      </a:rPr>
-                      <m:t>≤</m:t>
-                    </m:r>
-                    <m:sSub>
-                      <m:sSubPr>
-                        <m:ctrlPr>
-                          <a:rPr lang="x-IV_mathan" sz="2600" i="1">
-                            <a:solidFill>
-                              <a:schemeClr val="bg1"/>
-                            </a:solidFill>
-                            <a:effectLst/>
-                            <a:latin typeface="Cambria Math" panose="02040503050406030204" pitchFamily="18" charset="0"/>
-                          </a:rPr>
-                        </m:ctrlPr>
-                      </m:sSubPr>
-                      <m:e>
-                        <m:r>
-                          <a:rPr lang="x-IV_mathan" sz="2600">
-                            <a:solidFill>
-                              <a:schemeClr val="bg1"/>
-                            </a:solidFill>
-                            <a:effectLst/>
-                            <a:latin typeface="Cambria Math" panose="02040503050406030204" pitchFamily="18" charset="0"/>
-                          </a:rPr>
-                          <m:t>𝑔</m:t>
-                        </m:r>
-                      </m:e>
-                      <m:sub>
-                        <m:r>
-                          <a:rPr lang="x-IV_mathan" sz="2600">
-                            <a:solidFill>
-                              <a:schemeClr val="bg1"/>
-                            </a:solidFill>
-                            <a:effectLst/>
-                            <a:latin typeface="Cambria Math" panose="02040503050406030204" pitchFamily="18" charset="0"/>
-                          </a:rPr>
-                          <m:t>𝑠𝑖𝑧𝑒</m:t>
-                        </m:r>
-                      </m:sub>
-                    </m:sSub>
-                    <m:r>
-                      <a:rPr lang="x-IV_mathan" sz="2600">
-                        <a:solidFill>
-                          <a:schemeClr val="bg1"/>
-                        </a:solidFill>
-                        <a:effectLst/>
-                        <a:latin typeface="Cambria Math" panose="02040503050406030204" pitchFamily="18" charset="0"/>
-                      </a:rPr>
-                      <m:t>,</m:t>
-                    </m:r>
-                    <m:r>
-                      <a:rPr lang="en-US" sz="2600" b="0" i="1" smtClean="0">
-                        <a:solidFill>
-                          <a:schemeClr val="bg1"/>
-                        </a:solidFill>
-                        <a:effectLst/>
-                        <a:latin typeface="Cambria Math" panose="02040503050406030204" pitchFamily="18" charset="0"/>
-                      </a:rPr>
-                      <m:t> </m:t>
+                      <m:t>∈{0,</m:t>
                     </m:r>
                     <m:r>
                       <a:rPr lang="x-IV_mathan" sz="2600" i="1">
                         <a:solidFill>
                           <a:schemeClr val="bg1"/>
                         </a:solidFill>
-                        <a:effectLst/>
                         <a:latin typeface="Cambria Math" panose="02040503050406030204" pitchFamily="18" charset="0"/>
                       </a:rPr>
                       <m:t> </m:t>
@@ -15932,168 +15880,13 @@
                         <a:solidFill>
                           <a:schemeClr val="bg1"/>
                         </a:solidFill>
-                        <a:effectLst/>
                         <a:latin typeface="Cambria Math" panose="02040503050406030204" pitchFamily="18" charset="0"/>
                       </a:rPr>
-                      <m:t>𝑥</m:t>
-                    </m:r>
-                    <m:r>
-                      <a:rPr lang="x-IV_mathan" sz="2600" i="1">
-                        <a:solidFill>
-                          <a:schemeClr val="bg1"/>
-                        </a:solidFill>
-                        <a:effectLst/>
-                        <a:latin typeface="Cambria Math" panose="02040503050406030204" pitchFamily="18" charset="0"/>
-                      </a:rPr>
-                      <m:t> </m:t>
-                    </m:r>
-                    <m:r>
-                      <a:rPr lang="x-IV_mathan" sz="2600">
-                        <a:solidFill>
-                          <a:schemeClr val="bg1"/>
-                        </a:solidFill>
-                        <a:effectLst/>
-                        <a:latin typeface="Cambria Math" panose="02040503050406030204" pitchFamily="18" charset="0"/>
-                      </a:rPr>
-                      <m:t>∈</m:t>
-                    </m:r>
-                    <m:r>
-                      <a:rPr lang="x-IV_mathan" sz="2600" i="1">
-                        <a:solidFill>
-                          <a:schemeClr val="bg1"/>
-                        </a:solidFill>
-                        <a:effectLst/>
-                        <a:latin typeface="Cambria Math" panose="02040503050406030204" pitchFamily="18" charset="0"/>
-                      </a:rPr>
-                      <m:t> </m:t>
-                    </m:r>
-                    <m:r>
-                      <a:rPr lang="x-IV_mathan" sz="2600">
-                        <a:solidFill>
-                          <a:schemeClr val="bg1"/>
-                        </a:solidFill>
-                        <a:effectLst/>
-                        <a:latin typeface="Cambria Math" panose="02040503050406030204" pitchFamily="18" charset="0"/>
-                      </a:rPr>
-                      <m:t>ℤ</m:t>
+                      <m:t>1}</m:t>
                     </m:r>
                   </m:oMath>
                 </a14:m>
-                <a:endParaRPr lang="en-US" sz="2600" dirty="0">
-                  <a:solidFill>
-                    <a:schemeClr val="bg1"/>
-                  </a:solidFill>
-                  <a:effectLst/>
-                  <a:latin typeface="Cambria Math" panose="02040503050406030204" pitchFamily="18" charset="0"/>
-                </a:endParaRPr>
-              </a:p>
-              <a:p>
-                <a:pPr marL="2171576" lvl="1" indent="-685800">
-                  <a:buFont typeface="Arial" panose="020B0604020202020204" pitchFamily="34" charset="0"/>
-                  <a:buChar char="•"/>
-                </a:pPr>
-                <a14:m>
-                  <m:oMath xmlns:m="http://schemas.openxmlformats.org/officeDocument/2006/math">
-                    <m:sSub>
-                      <m:sSubPr>
-                        <m:ctrlPr>
-                          <a:rPr lang="x-IV_mathan" sz="2600" i="1" smtClean="0">
-                            <a:solidFill>
-                              <a:schemeClr val="bg1"/>
-                            </a:solidFill>
-                            <a:effectLst/>
-                            <a:latin typeface="Cambria Math" panose="02040503050406030204" pitchFamily="18" charset="0"/>
-                          </a:rPr>
-                        </m:ctrlPr>
-                      </m:sSubPr>
-                      <m:e>
-                        <m:r>
-                          <a:rPr lang="x-IV_mathan" sz="2600">
-                            <a:solidFill>
-                              <a:schemeClr val="bg1"/>
-                            </a:solidFill>
-                            <a:effectLst/>
-                            <a:latin typeface="Cambria Math" panose="02040503050406030204" pitchFamily="18" charset="0"/>
-                          </a:rPr>
-                          <m:t>𝑔</m:t>
-                        </m:r>
-                      </m:e>
-                      <m:sub>
-                        <m:r>
-                          <a:rPr lang="x-IV_mathan" sz="2600">
-                            <a:solidFill>
-                              <a:schemeClr val="bg1"/>
-                            </a:solidFill>
-                            <a:effectLst/>
-                            <a:latin typeface="Cambria Math" panose="02040503050406030204" pitchFamily="18" charset="0"/>
-                          </a:rPr>
-                          <m:t>𝑠𝑖𝑧𝑒</m:t>
-                        </m:r>
-                      </m:sub>
-                    </m:sSub>
-                    <m:r>
-                      <a:rPr lang="x-IV_mathan" sz="2600">
-                        <a:solidFill>
-                          <a:schemeClr val="bg1"/>
-                        </a:solidFill>
-                        <a:effectLst/>
-                        <a:latin typeface="Cambria Math" panose="02040503050406030204" pitchFamily="18" charset="0"/>
-                      </a:rPr>
-                      <m:t>=</m:t>
-                    </m:r>
-                    <m:r>
-                      <a:rPr lang="x-IV_mathan" sz="2600">
-                        <a:solidFill>
-                          <a:schemeClr val="bg1"/>
-                        </a:solidFill>
-                        <a:effectLst/>
-                        <a:latin typeface="Cambria Math" panose="02040503050406030204" pitchFamily="18" charset="0"/>
-                      </a:rPr>
-                      <m:t>𝑠𝑖𝑧𝑒</m:t>
-                    </m:r>
-                    <m:r>
-                      <a:rPr lang="x-IV_mathan" sz="2600" i="1">
-                        <a:solidFill>
-                          <a:schemeClr val="bg1"/>
-                        </a:solidFill>
-                        <a:effectLst/>
-                        <a:latin typeface="Cambria Math" panose="02040503050406030204" pitchFamily="18" charset="0"/>
-                      </a:rPr>
-                      <m:t> </m:t>
-                    </m:r>
-                    <m:r>
-                      <a:rPr lang="x-IV_mathan" sz="2600">
-                        <a:solidFill>
-                          <a:schemeClr val="bg1"/>
-                        </a:solidFill>
-                        <a:effectLst/>
-                        <a:latin typeface="Cambria Math" panose="02040503050406030204" pitchFamily="18" charset="0"/>
-                      </a:rPr>
-                      <m:t>𝑜𝑓</m:t>
-                    </m:r>
-                    <m:r>
-                      <a:rPr lang="x-IV_mathan" sz="2600" i="1">
-                        <a:solidFill>
-                          <a:schemeClr val="bg1"/>
-                        </a:solidFill>
-                        <a:effectLst/>
-                        <a:latin typeface="Cambria Math" panose="02040503050406030204" pitchFamily="18" charset="0"/>
-                      </a:rPr>
-                      <m:t> </m:t>
-                    </m:r>
-                    <m:r>
-                      <a:rPr lang="x-IV_mathan" sz="2600">
-                        <a:solidFill>
-                          <a:schemeClr val="bg1"/>
-                        </a:solidFill>
-                        <a:effectLst/>
-                        <a:latin typeface="Cambria Math" panose="02040503050406030204" pitchFamily="18" charset="0"/>
-                      </a:rPr>
-                      <m:t>𝑔𝑟𝑖𝑑</m:t>
-                    </m:r>
-                  </m:oMath>
-                </a14:m>
-                <a:endParaRPr lang="en-US" sz="2600" dirty="0">
+                <a:endParaRPr lang="en-US" sz="2600" b="1" dirty="0">
                   <a:solidFill>
                     <a:schemeClr val="bg1"/>
                   </a:solidFill>
@@ -16197,7 +15990,7 @@
         <p:spPr>
           <a:xfrm>
             <a:off x="1591949" y="5972449"/>
-            <a:ext cx="1682255" cy="369332"/>
+            <a:ext cx="1773371" cy="369332"/>
           </a:xfrm>
           <a:prstGeom prst="rect">
             <a:avLst/>
@@ -16212,7 +16005,7 @@
           <a:p>
             <a:r>
               <a:rPr lang="en-US" dirty="0"/>
-              <a:t>Distance to goal</a:t>
+              <a:t>Direction of food</a:t>
             </a:r>
           </a:p>
         </p:txBody>
@@ -16445,38 +16238,8 @@
           </a:p>
         </p:txBody>
       </p:sp>
-      <p:pic>
-        <p:nvPicPr>
-          <p:cNvPr id="49" name="Picture 48">
-            <a:extLst>
-              <a:ext uri="{FF2B5EF4-FFF2-40B4-BE49-F238E27FC236}">
-                <a16:creationId xmlns:a16="http://schemas.microsoft.com/office/drawing/2014/main" id="{EFC5E0D8-93DC-4B6D-AD6B-F4D7625BD3A4}"/>
-              </a:ext>
-            </a:extLst>
-          </p:cNvPr>
-          <p:cNvPicPr>
-            <a:picLocks noChangeAspect="1"/>
-          </p:cNvPicPr>
-          <p:nvPr/>
-        </p:nvPicPr>
-        <p:blipFill>
-          <a:blip r:embed="rId4"/>
-          <a:stretch>
-            <a:fillRect/>
-          </a:stretch>
-        </p:blipFill>
-        <p:spPr>
-          <a:xfrm>
-            <a:off x="294155" y="6419032"/>
-            <a:ext cx="4277845" cy="3368657"/>
-          </a:xfrm>
-          <a:prstGeom prst="rect">
-            <a:avLst/>
-          </a:prstGeom>
-        </p:spPr>
-      </p:pic>
-      <mc:AlternateContent xmlns:mc="http://schemas.openxmlformats.org/markup-compatibility/2006" xmlns:a14="http://schemas.microsoft.com/office/drawing/2010/main">
-        <mc:Choice Requires="a14">
+      <mc:AlternateContent xmlns:mc="http://schemas.openxmlformats.org/markup-compatibility/2006">
+        <mc:Choice xmlns:a14="http://schemas.microsoft.com/office/drawing/2010/main" Requires="a14">
           <p:sp>
             <p:nvSpPr>
               <p:cNvPr id="50" name="TextBox 49">
@@ -16491,8 +16254,8 @@
             </p:nvSpPr>
             <p:spPr>
               <a:xfrm>
-                <a:off x="4688953" y="7714509"/>
-                <a:ext cx="2278188" cy="646331"/>
+                <a:off x="5047535" y="7114344"/>
+                <a:ext cx="3493264" cy="1200329"/>
               </a:xfrm>
               <a:prstGeom prst="rect">
                 <a:avLst/>
@@ -16514,11 +16277,69 @@
                   </a:spcAft>
                 </a:pPr>
                 <a:r>
+                  <a:rPr lang="en-US" dirty="0" err="1">
+                    <a:latin typeface="Courier New" panose="02070309020205020404" pitchFamily="49" charset="0"/>
+                    <a:cs typeface="Courier New" panose="02070309020205020404" pitchFamily="49" charset="0"/>
+                  </a:rPr>
+                  <a:t>food_direction_down</a:t>
+                </a:r>
+                <a:r>
+                  <a:rPr lang="en-US" dirty="0">
+                    <a:latin typeface="Courier New" panose="02070309020205020404" pitchFamily="49" charset="0"/>
+                    <a:cs typeface="Courier New" panose="02070309020205020404" pitchFamily="49" charset="0"/>
+                  </a:rPr>
+                  <a:t> = 1</a:t>
+                </a:r>
+              </a:p>
+              <a:p>
+                <a:pPr marL="0" marR="0">
+                  <a:spcBef>
+                    <a:spcPts val="0"/>
+                  </a:spcBef>
+                  <a:spcAft>
+                    <a:spcPts val="0"/>
+                  </a:spcAft>
+                </a:pPr>
+                <a:r>
+                  <a:rPr lang="en-US" dirty="0" err="1">
+                    <a:latin typeface="Courier New" panose="02070309020205020404" pitchFamily="49" charset="0"/>
+                    <a:cs typeface="Courier New" panose="02070309020205020404" pitchFamily="49" charset="0"/>
+                  </a:rPr>
+                  <a:t>food_direction_up</a:t>
+                </a:r>
+                <a:r>
+                  <a:rPr lang="en-US" dirty="0">
+                    <a:latin typeface="Courier New" panose="02070309020205020404" pitchFamily="49" charset="0"/>
+                    <a:cs typeface="Courier New" panose="02070309020205020404" pitchFamily="49" charset="0"/>
+                  </a:rPr>
+                  <a:t> = 0</a:t>
+                </a:r>
+                <a:br>
                   <a:rPr lang="x-IV_mathan" dirty="0">
                     <a:latin typeface="Courier New" panose="02070309020205020404" pitchFamily="49" charset="0"/>
                     <a:cs typeface="Courier New" panose="02070309020205020404" pitchFamily="49" charset="0"/>
                   </a:rPr>
-                  <a:t>distance_x = </a:t>
+                </a:br>
+                <a:r>
+                  <a:rPr lang="x-IV_mathan" dirty="0">
+                    <a:latin typeface="Courier New" panose="02070309020205020404" pitchFamily="49" charset="0"/>
+                    <a:cs typeface="Courier New" panose="02070309020205020404" pitchFamily="49" charset="0"/>
+                  </a:rPr>
+                  <a:t>food</a:t>
+                </a:r>
+                <a:r>
+                  <a:rPr lang="en-US" dirty="0">
+                    <a:latin typeface="Courier New" panose="02070309020205020404" pitchFamily="49" charset="0"/>
+                    <a:cs typeface="Courier New" panose="02070309020205020404" pitchFamily="49" charset="0"/>
+                  </a:rPr>
+                  <a:t>_direction</a:t>
+                </a:r>
+                <a:r>
+                  <a:rPr lang="x-IV_mathan" dirty="0">
+                    <a:latin typeface="Courier New" panose="02070309020205020404" pitchFamily="49" charset="0"/>
+                    <a:cs typeface="Courier New" panose="02070309020205020404" pitchFamily="49" charset="0"/>
+                  </a:rPr>
+                  <a:t>_left = </a:t>
                 </a:r>
                 <a14:m>
                   <m:oMath xmlns:m="http://schemas.openxmlformats.org/officeDocument/2006/math">
@@ -16527,7 +16348,7 @@
                         <a:latin typeface="Cambria Math" panose="02040503050406030204" pitchFamily="18" charset="0"/>
                         <a:cs typeface="Courier New" panose="02070309020205020404" pitchFamily="49" charset="0"/>
                       </a:rPr>
-                      <m:t>−2</m:t>
+                      <m:t>1</m:t>
                     </m:r>
                   </m:oMath>
                 </a14:m>
@@ -16546,11 +16367,39 @@
                   </a:spcAft>
                 </a:pPr>
                 <a:r>
+                  <a:rPr lang="en-US" dirty="0">
+                    <a:latin typeface="Courier New" panose="02070309020205020404" pitchFamily="49" charset="0"/>
+                    <a:cs typeface="Courier New" panose="02070309020205020404" pitchFamily="49" charset="0"/>
+                  </a:rPr>
+                  <a:t>f</a:t>
+                </a:r>
+                <a:r>
                   <a:rPr lang="x-IV_mathan" dirty="0">
                     <a:latin typeface="Courier New" panose="02070309020205020404" pitchFamily="49" charset="0"/>
                     <a:cs typeface="Courier New" panose="02070309020205020404" pitchFamily="49" charset="0"/>
                   </a:rPr>
-                  <a:t>distance_y = -2</a:t>
+                  <a:t>ood</a:t>
+                </a:r>
+                <a:r>
+                  <a:rPr lang="en-US">
+                    <a:latin typeface="Courier New" panose="02070309020205020404" pitchFamily="49" charset="0"/>
+                    <a:cs typeface="Courier New" panose="02070309020205020404" pitchFamily="49" charset="0"/>
+                  </a:rPr>
+                  <a:t>_direction</a:t>
+                </a:r>
+                <a:r>
+                  <a:rPr lang="x-IV_mathan">
+                    <a:latin typeface="Courier New" panose="02070309020205020404" pitchFamily="49" charset="0"/>
+                    <a:cs typeface="Courier New" panose="02070309020205020404" pitchFamily="49" charset="0"/>
+                  </a:rPr>
+                  <a:t>_</a:t>
+                </a:r>
+                <a:r>
+                  <a:rPr lang="x-IV_mathan" dirty="0">
+                    <a:latin typeface="Courier New" panose="02070309020205020404" pitchFamily="49" charset="0"/>
+                    <a:cs typeface="Courier New" panose="02070309020205020404" pitchFamily="49" charset="0"/>
+                  </a:rPr>
+                  <a:t>right = 0</a:t>
                 </a:r>
                 <a:endParaRPr lang="x-IV_mathan" sz="1800" dirty="0">
                   <a:effectLst/>
@@ -16560,7 +16409,7 @@
             </p:txBody>
           </p:sp>
         </mc:Choice>
-        <mc:Fallback xmlns="">
+        <mc:Fallback>
           <p:sp>
             <p:nvSpPr>
               <p:cNvPr id="50" name="TextBox 49">
@@ -16577,16 +16426,16 @@
             </p:nvSpPr>
             <p:spPr>
               <a:xfrm>
-                <a:off x="4688953" y="7714509"/>
-                <a:ext cx="2278188" cy="646331"/>
+                <a:off x="5047535" y="7114344"/>
+                <a:ext cx="3493264" cy="1200329"/>
               </a:xfrm>
               <a:prstGeom prst="rect">
                 <a:avLst/>
               </a:prstGeom>
               <a:blipFill>
-                <a:blip r:embed="rId5"/>
+                <a:blip r:embed="rId4"/>
                 <a:stretch>
-                  <a:fillRect l="-2139" t="-4717" r="-267" b="-15094"/>
+                  <a:fillRect l="-1396" t="-2538" r="-524" b="-7614"/>
                 </a:stretch>
               </a:blipFill>
             </p:spPr>
@@ -16605,6 +16454,36 @@
           </p:sp>
         </mc:Fallback>
       </mc:AlternateContent>
+      <p:pic>
+        <p:nvPicPr>
+          <p:cNvPr id="5" name="Picture 4">
+            <a:extLst>
+              <a:ext uri="{FF2B5EF4-FFF2-40B4-BE49-F238E27FC236}">
+                <a16:creationId xmlns:a16="http://schemas.microsoft.com/office/drawing/2014/main" id="{29237561-C07B-4E16-9A04-E5255F8E5DA2}"/>
+              </a:ext>
+            </a:extLst>
+          </p:cNvPr>
+          <p:cNvPicPr>
+            <a:picLocks noChangeAspect="1"/>
+          </p:cNvPicPr>
+          <p:nvPr/>
+        </p:nvPicPr>
+        <p:blipFill>
+          <a:blip r:embed="rId5"/>
+          <a:stretch>
+            <a:fillRect/>
+          </a:stretch>
+        </p:blipFill>
+        <p:spPr>
+          <a:xfrm>
+            <a:off x="241893" y="6410609"/>
+            <a:ext cx="4382364" cy="3450962"/>
+          </a:xfrm>
+          <a:prstGeom prst="rect">
+            <a:avLst/>
+          </a:prstGeom>
+        </p:spPr>
+      </p:pic>
     </p:spTree>
     <p:extLst>
       <p:ext uri="{BB962C8B-B14F-4D97-AF65-F5344CB8AC3E}">
@@ -16910,7 +16789,7 @@
         </p:blipFill>
         <p:spPr>
           <a:xfrm>
-            <a:off x="9680654" y="1060897"/>
+            <a:off x="9680654" y="1175913"/>
             <a:ext cx="4352980" cy="3427824"/>
           </a:xfrm>
           <a:prstGeom prst="rect">
@@ -17390,8 +17269,8 @@
           </a:p>
         </p:txBody>
       </p:sp>
-      <mc:AlternateContent xmlns:mc="http://schemas.openxmlformats.org/markup-compatibility/2006">
-        <mc:Choice xmlns:a14="http://schemas.microsoft.com/office/drawing/2010/main" Requires="a14">
+      <mc:AlternateContent xmlns:mc="http://schemas.openxmlformats.org/markup-compatibility/2006" xmlns:a14="http://schemas.microsoft.com/office/drawing/2010/main">
+        <mc:Choice Requires="a14">
           <p:sp>
             <p:nvSpPr>
               <p:cNvPr id="35" name="Text Placeholder 3">
@@ -17744,7 +17623,7 @@
             </p:txBody>
           </p:sp>
         </mc:Choice>
-        <mc:Fallback>
+        <mc:Fallback xmlns="">
           <p:sp>
             <p:nvSpPr>
               <p:cNvPr id="35" name="Text Placeholder 3">
@@ -17821,6 +17700,443 @@
       </p:grpSpPr>
       <p:sp>
         <p:nvSpPr>
+          <p:cNvPr id="2" name="Title 1">
+            <a:extLst>
+              <a:ext uri="{FF2B5EF4-FFF2-40B4-BE49-F238E27FC236}">
+                <a16:creationId xmlns:a16="http://schemas.microsoft.com/office/drawing/2014/main" id="{CB1DFDB8-66A1-4CFF-83F1-E176EC0E6680}"/>
+              </a:ext>
+            </a:extLst>
+          </p:cNvPr>
+          <p:cNvSpPr>
+            <a:spLocks noGrp="1"/>
+          </p:cNvSpPr>
+          <p:nvPr>
+            <p:ph type="title"/>
+          </p:nvPr>
+        </p:nvSpPr>
+        <p:spPr>
+          <a:xfrm>
+            <a:off x="10103370" y="868643"/>
+            <a:ext cx="6985416" cy="2862093"/>
+          </a:xfrm>
+        </p:spPr>
+        <p:txBody>
+          <a:bodyPr/>
+          <a:lstStyle/>
+          <a:p>
+            <a:pPr algn="ctr"/>
+            <a:r>
+              <a:rPr lang="en-US" sz="6000" dirty="0"/>
+              <a:t>Defining State Attributes</a:t>
+            </a:r>
+          </a:p>
+        </p:txBody>
+      </p:sp>
+      <mc:AlternateContent xmlns:mc="http://schemas.openxmlformats.org/markup-compatibility/2006">
+        <mc:Choice xmlns:a14="http://schemas.microsoft.com/office/drawing/2010/main" Requires="a14">
+          <p:sp>
+            <p:nvSpPr>
+              <p:cNvPr id="4" name="Text Placeholder 3">
+                <a:extLst>
+                  <a:ext uri="{FF2B5EF4-FFF2-40B4-BE49-F238E27FC236}">
+                    <a16:creationId xmlns:a16="http://schemas.microsoft.com/office/drawing/2014/main" id="{5FE2C5C2-9E6A-447E-AE3F-08FC7BB25750}"/>
+                  </a:ext>
+                </a:extLst>
+              </p:cNvPr>
+              <p:cNvSpPr>
+                <a:spLocks noGrp="1"/>
+              </p:cNvSpPr>
+              <p:nvPr>
+                <p:ph type="body" sz="quarter" idx="10"/>
+              </p:nvPr>
+            </p:nvSpPr>
+            <p:spPr>
+              <a:xfrm>
+                <a:off x="9447316" y="2777827"/>
+                <a:ext cx="7983615" cy="6389243"/>
+              </a:xfrm>
+            </p:spPr>
+            <p:txBody>
+              <a:bodyPr/>
+              <a:lstStyle/>
+              <a:p>
+                <a:pPr marL="685800" indent="-685800">
+                  <a:buFont typeface="Arial" panose="020B0604020202020204" pitchFamily="34" charset="0"/>
+                  <a:buChar char="•"/>
+                </a:pPr>
+                <a:r>
+                  <a:rPr lang="en-US" sz="3000" b="1" dirty="0"/>
+                  <a:t>Length of Body: </a:t>
+                </a:r>
+                <a:r>
+                  <a:rPr lang="en-US" sz="3000" dirty="0"/>
+                  <a:t>As the body grows, the length will affect how the snake can move. Often the body will be blocking the food and the straight path is not the right one. In a perfect game, the tail length could be </a:t>
+                </a:r>
+                <a14:m>
+                  <m:oMath xmlns:m="http://schemas.openxmlformats.org/officeDocument/2006/math">
+                    <m:r>
+                      <a:rPr lang="en-US" sz="3000" b="0" i="1" smtClean="0">
+                        <a:latin typeface="Cambria Math" panose="02040503050406030204" pitchFamily="18" charset="0"/>
+                      </a:rPr>
+                      <m:t>𝑔𝑟𝑖𝑑𝑠𝑖𝑧</m:t>
+                    </m:r>
+                    <m:sSup>
+                      <m:sSupPr>
+                        <m:ctrlPr>
+                          <a:rPr lang="en-US" sz="3000" b="0" i="1" smtClean="0">
+                            <a:latin typeface="Cambria Math" panose="02040503050406030204" pitchFamily="18" charset="0"/>
+                          </a:rPr>
+                        </m:ctrlPr>
+                      </m:sSupPr>
+                      <m:e>
+                        <m:r>
+                          <a:rPr lang="en-US" sz="3000" b="0" i="1" smtClean="0">
+                            <a:latin typeface="Cambria Math" panose="02040503050406030204" pitchFamily="18" charset="0"/>
+                          </a:rPr>
+                          <m:t>𝑒</m:t>
+                        </m:r>
+                      </m:e>
+                      <m:sup>
+                        <m:r>
+                          <a:rPr lang="en-US" sz="3000" b="0" i="1" smtClean="0">
+                            <a:latin typeface="Cambria Math" panose="02040503050406030204" pitchFamily="18" charset="0"/>
+                          </a:rPr>
+                          <m:t>2</m:t>
+                        </m:r>
+                      </m:sup>
+                    </m:sSup>
+                  </m:oMath>
+                </a14:m>
+                <a:endParaRPr lang="en-US" sz="3000" b="1" dirty="0"/>
+              </a:p>
+              <a:p>
+                <a:pPr marL="2171576" lvl="1" indent="-685800">
+                  <a:buFont typeface="Arial" panose="020B0604020202020204" pitchFamily="34" charset="0"/>
+                  <a:buChar char="•"/>
+                </a:pPr>
+                <a:r>
+                  <a:rPr lang="x-IV_mathan" sz="2600" dirty="0">
+                    <a:solidFill>
+                      <a:schemeClr val="bg1"/>
+                    </a:solidFill>
+                    <a:effectLst/>
+                  </a:rPr>
+                  <a:t>0 ≤ </a:t>
+                </a:r>
+                <a14:m>
+                  <m:oMath xmlns:m="http://schemas.openxmlformats.org/officeDocument/2006/math">
+                    <m:r>
+                      <a:rPr lang="x-IV_mathan" sz="2600" smtClean="0">
+                        <a:solidFill>
+                          <a:schemeClr val="bg1"/>
+                        </a:solidFill>
+                        <a:effectLst/>
+                        <a:latin typeface="Cambria Math" panose="02040503050406030204" pitchFamily="18" charset="0"/>
+                      </a:rPr>
+                      <m:t>𝑥</m:t>
+                    </m:r>
+                    <m:r>
+                      <a:rPr lang="en-US" sz="2600" b="0" i="0" smtClean="0">
+                        <a:solidFill>
+                          <a:schemeClr val="bg1"/>
+                        </a:solidFill>
+                        <a:effectLst/>
+                        <a:latin typeface="Cambria Math" panose="02040503050406030204" pitchFamily="18" charset="0"/>
+                      </a:rPr>
+                      <m:t>≤</m:t>
+                    </m:r>
+                    <m:sSup>
+                      <m:sSupPr>
+                        <m:ctrlPr>
+                          <a:rPr lang="en-US" sz="2600" b="0" i="0" smtClean="0">
+                            <a:solidFill>
+                              <a:schemeClr val="bg1"/>
+                            </a:solidFill>
+                            <a:effectLst/>
+                            <a:latin typeface="Cambria Math" panose="02040503050406030204" pitchFamily="18" charset="0"/>
+                          </a:rPr>
+                        </m:ctrlPr>
+                      </m:sSupPr>
+                      <m:e>
+                        <m:r>
+                          <m:rPr>
+                            <m:sty m:val="p"/>
+                          </m:rPr>
+                          <a:rPr lang="en-US" sz="2600" b="0" i="0" smtClean="0">
+                            <a:solidFill>
+                              <a:schemeClr val="bg1"/>
+                            </a:solidFill>
+                            <a:effectLst/>
+                            <a:latin typeface="Cambria Math" panose="02040503050406030204" pitchFamily="18" charset="0"/>
+                          </a:rPr>
+                          <m:t>gridsize</m:t>
+                        </m:r>
+                      </m:e>
+                      <m:sup>
+                        <m:r>
+                          <a:rPr lang="en-US" sz="2600" b="0" i="0" smtClean="0">
+                            <a:solidFill>
+                              <a:schemeClr val="bg1"/>
+                            </a:solidFill>
+                            <a:effectLst/>
+                            <a:latin typeface="Cambria Math" panose="02040503050406030204" pitchFamily="18" charset="0"/>
+                          </a:rPr>
+                          <m:t>2</m:t>
+                        </m:r>
+                      </m:sup>
+                    </m:sSup>
+                  </m:oMath>
+                </a14:m>
+                <a:endParaRPr lang="en-US" sz="2600" b="1" dirty="0">
+                  <a:solidFill>
+                    <a:schemeClr val="bg1"/>
+                  </a:solidFill>
+                </a:endParaRPr>
+              </a:p>
+              <a:p>
+                <a:pPr lvl="1" indent="0">
+                  <a:buNone/>
+                </a:pPr>
+                <a:endParaRPr lang="en-US" sz="3800" b="1" dirty="0"/>
+              </a:p>
+              <a:p>
+                <a:pPr lvl="1" indent="0">
+                  <a:buNone/>
+                </a:pPr>
+                <a:r>
+                  <a:rPr lang="en-US" sz="3800" dirty="0"/>
+                  <a:t> </a:t>
+                </a:r>
+                <a:endParaRPr lang="en-US" sz="3400" b="1" dirty="0">
+                  <a:solidFill>
+                    <a:schemeClr val="bg1"/>
+                  </a:solidFill>
+                </a:endParaRPr>
+              </a:p>
+            </p:txBody>
+          </p:sp>
+        </mc:Choice>
+        <mc:Fallback>
+          <p:sp>
+            <p:nvSpPr>
+              <p:cNvPr id="4" name="Text Placeholder 3">
+                <a:extLst>
+                  <a:ext uri="{FF2B5EF4-FFF2-40B4-BE49-F238E27FC236}">
+                    <a16:creationId xmlns:a16="http://schemas.microsoft.com/office/drawing/2014/main" id="{5FE2C5C2-9E6A-447E-AE3F-08FC7BB25750}"/>
+                  </a:ext>
+                </a:extLst>
+              </p:cNvPr>
+              <p:cNvSpPr>
+                <a:spLocks noGrp="1" noRot="1" noChangeAspect="1" noMove="1" noResize="1" noEditPoints="1" noAdjustHandles="1" noChangeArrowheads="1" noChangeShapeType="1" noTextEdit="1"/>
+              </p:cNvSpPr>
+              <p:nvPr>
+                <p:ph type="body" sz="quarter" idx="10"/>
+              </p:nvPr>
+            </p:nvSpPr>
+            <p:spPr>
+              <a:xfrm>
+                <a:off x="9447316" y="2777827"/>
+                <a:ext cx="7983615" cy="6389243"/>
+              </a:xfrm>
+              <a:blipFill>
+                <a:blip r:embed="rId2"/>
+                <a:stretch>
+                  <a:fillRect l="-2750" t="-2672" r="-3285"/>
+                </a:stretch>
+              </a:blipFill>
+            </p:spPr>
+            <p:txBody>
+              <a:bodyPr/>
+              <a:lstStyle/>
+              <a:p>
+                <a:r>
+                  <a:rPr lang="en-US">
+                    <a:noFill/>
+                  </a:rPr>
+                  <a:t> </a:t>
+                </a:r>
+              </a:p>
+            </p:txBody>
+          </p:sp>
+        </mc:Fallback>
+      </mc:AlternateContent>
+      <p:sp>
+        <p:nvSpPr>
+          <p:cNvPr id="44" name="TextBox 43">
+            <a:extLst>
+              <a:ext uri="{FF2B5EF4-FFF2-40B4-BE49-F238E27FC236}">
+                <a16:creationId xmlns:a16="http://schemas.microsoft.com/office/drawing/2014/main" id="{FAA82857-950D-4D70-A77B-61A205A765D0}"/>
+              </a:ext>
+            </a:extLst>
+          </p:cNvPr>
+          <p:cNvSpPr txBox="1"/>
+          <p:nvPr/>
+        </p:nvSpPr>
+        <p:spPr>
+          <a:xfrm>
+            <a:off x="4646611" y="705396"/>
+            <a:ext cx="3538020" cy="369332"/>
+          </a:xfrm>
+          <a:prstGeom prst="rect">
+            <a:avLst/>
+          </a:prstGeom>
+          <a:noFill/>
+        </p:spPr>
+        <p:txBody>
+          <a:bodyPr wrap="none" rtlCol="0">
+            <a:spAutoFit/>
+          </a:bodyPr>
+          <a:lstStyle/>
+          <a:p>
+            <a:r>
+              <a:rPr lang="en-US" dirty="0"/>
+              <a:t>Body Length Affects Possible Moves</a:t>
+            </a:r>
+          </a:p>
+        </p:txBody>
+      </p:sp>
+      <p:sp>
+        <p:nvSpPr>
+          <p:cNvPr id="45" name="TextBox 44">
+            <a:extLst>
+              <a:ext uri="{FF2B5EF4-FFF2-40B4-BE49-F238E27FC236}">
+                <a16:creationId xmlns:a16="http://schemas.microsoft.com/office/drawing/2014/main" id="{EA04A2F7-9E9D-4040-893C-26431C06A115}"/>
+              </a:ext>
+            </a:extLst>
+          </p:cNvPr>
+          <p:cNvSpPr txBox="1"/>
+          <p:nvPr/>
+        </p:nvSpPr>
+        <p:spPr>
+          <a:xfrm>
+            <a:off x="0" y="37646"/>
+            <a:ext cx="2506840" cy="646331"/>
+          </a:xfrm>
+          <a:prstGeom prst="rect">
+            <a:avLst/>
+          </a:prstGeom>
+          <a:noFill/>
+        </p:spPr>
+        <p:txBody>
+          <a:bodyPr wrap="none" rtlCol="0">
+            <a:spAutoFit/>
+          </a:bodyPr>
+          <a:lstStyle/>
+          <a:p>
+            <a:r>
+              <a:rPr lang="en-US" sz="3600" dirty="0"/>
+              <a:t>Body Length</a:t>
+            </a:r>
+          </a:p>
+        </p:txBody>
+      </p:sp>
+      <p:sp>
+        <p:nvSpPr>
+          <p:cNvPr id="47" name="TextBox 46">
+            <a:extLst>
+              <a:ext uri="{FF2B5EF4-FFF2-40B4-BE49-F238E27FC236}">
+                <a16:creationId xmlns:a16="http://schemas.microsoft.com/office/drawing/2014/main" id="{9D6D9C87-639D-4750-9CF4-87C5D816BDE9}"/>
+              </a:ext>
+            </a:extLst>
+          </p:cNvPr>
+          <p:cNvSpPr txBox="1"/>
+          <p:nvPr/>
+        </p:nvSpPr>
+        <p:spPr>
+          <a:xfrm>
+            <a:off x="1375735" y="1976792"/>
+            <a:ext cx="2252540" cy="369332"/>
+          </a:xfrm>
+          <a:prstGeom prst="rect">
+            <a:avLst/>
+          </a:prstGeom>
+          <a:noFill/>
+        </p:spPr>
+        <p:txBody>
+          <a:bodyPr wrap="none" rtlCol="0">
+            <a:spAutoFit/>
+          </a:bodyPr>
+          <a:lstStyle/>
+          <a:p>
+            <a:r>
+              <a:rPr lang="en-US" dirty="0" err="1">
+                <a:latin typeface="Courier New" panose="02070309020205020404" pitchFamily="49" charset="0"/>
+                <a:cs typeface="Courier New" panose="02070309020205020404" pitchFamily="49" charset="0"/>
+              </a:rPr>
+              <a:t>body_length</a:t>
+            </a:r>
+            <a:r>
+              <a:rPr lang="en-US" dirty="0">
+                <a:latin typeface="Courier New" panose="02070309020205020404" pitchFamily="49" charset="0"/>
+                <a:cs typeface="Courier New" panose="02070309020205020404" pitchFamily="49" charset="0"/>
+              </a:rPr>
+              <a:t> = 7</a:t>
+            </a:r>
+          </a:p>
+        </p:txBody>
+      </p:sp>
+      <p:pic>
+        <p:nvPicPr>
+          <p:cNvPr id="6" name="Picture 5">
+            <a:extLst>
+              <a:ext uri="{FF2B5EF4-FFF2-40B4-BE49-F238E27FC236}">
+                <a16:creationId xmlns:a16="http://schemas.microsoft.com/office/drawing/2014/main" id="{2297A7E1-C35C-4CEC-BC56-33C3BCB745AC}"/>
+              </a:ext>
+            </a:extLst>
+          </p:cNvPr>
+          <p:cNvPicPr>
+            <a:picLocks noChangeAspect="1"/>
+          </p:cNvPicPr>
+          <p:nvPr/>
+        </p:nvPicPr>
+        <p:blipFill>
+          <a:blip r:embed="rId3"/>
+          <a:stretch>
+            <a:fillRect/>
+          </a:stretch>
+        </p:blipFill>
+        <p:spPr>
+          <a:xfrm>
+            <a:off x="4146469" y="1331995"/>
+            <a:ext cx="4409701" cy="3472489"/>
+          </a:xfrm>
+          <a:prstGeom prst="rect">
+            <a:avLst/>
+          </a:prstGeom>
+        </p:spPr>
+      </p:pic>
+    </p:spTree>
+    <p:extLst>
+      <p:ext uri="{BB962C8B-B14F-4D97-AF65-F5344CB8AC3E}">
+        <p14:creationId xmlns:p14="http://schemas.microsoft.com/office/powerpoint/2010/main" val="2951170738"/>
+      </p:ext>
+    </p:extLst>
+  </p:cSld>
+  <p:clrMapOvr>
+    <a:masterClrMapping/>
+  </p:clrMapOvr>
+</p:sld>
+</file>
+
+<file path=ppt/slides/slide7.xml><?xml version="1.0" encoding="utf-8"?>
+<p:sld xmlns:a="http://schemas.openxmlformats.org/drawingml/2006/main" xmlns:r="http://schemas.openxmlformats.org/officeDocument/2006/relationships" xmlns:p="http://schemas.openxmlformats.org/presentationml/2006/main">
+  <p:cSld>
+    <p:spTree>
+      <p:nvGrpSpPr>
+        <p:cNvPr id="1" name=""/>
+        <p:cNvGrpSpPr/>
+        <p:nvPr/>
+      </p:nvGrpSpPr>
+      <p:grpSpPr>
+        <a:xfrm>
+          <a:off x="0" y="0"/>
+          <a:ext cx="0" cy="0"/>
+          <a:chOff x="0" y="0"/>
+          <a:chExt cx="0" cy="0"/>
+        </a:xfrm>
+      </p:grpSpPr>
+      <p:sp>
+        <p:nvSpPr>
           <p:cNvPr id="7" name="Title 6">
             <a:extLst>
               <a:ext uri="{FF2B5EF4-FFF2-40B4-BE49-F238E27FC236}">
@@ -17847,8 +18163,8 @@
           </a:p>
         </p:txBody>
       </p:sp>
-      <mc:AlternateContent xmlns:mc="http://schemas.openxmlformats.org/markup-compatibility/2006">
-        <mc:Choice xmlns:a14="http://schemas.microsoft.com/office/drawing/2010/main" Requires="a14">
+      <mc:AlternateContent xmlns:mc="http://schemas.openxmlformats.org/markup-compatibility/2006" xmlns:a14="http://schemas.microsoft.com/office/drawing/2010/main">
+        <mc:Choice Requires="a14">
           <p:sp>
             <p:nvSpPr>
               <p:cNvPr id="8" name="Text Placeholder 7">
@@ -18284,7 +18600,7 @@
             </p:txBody>
           </p:sp>
         </mc:Choice>
-        <mc:Fallback>
+        <mc:Fallback xmlns="">
           <p:sp>
             <p:nvSpPr>
               <p:cNvPr id="8" name="Text Placeholder 7">
@@ -18341,7 +18657,7 @@
 </p:sld>
 </file>
 
-<file path=ppt/slides/slide7.xml><?xml version="1.0" encoding="utf-8"?>
+<file path=ppt/slides/slide8.xml><?xml version="1.0" encoding="utf-8"?>
 <p:sld xmlns:a="http://schemas.openxmlformats.org/drawingml/2006/main" xmlns:r="http://schemas.openxmlformats.org/officeDocument/2006/relationships" xmlns:p="http://schemas.openxmlformats.org/presentationml/2006/main">
   <p:cSld>
     <p:spTree>
@@ -20045,7 +20361,7 @@
 </p:sld>
 </file>
 
-<file path=ppt/slides/slide8.xml><?xml version="1.0" encoding="utf-8"?>
+<file path=ppt/slides/slide9.xml><?xml version="1.0" encoding="utf-8"?>
 <p:sld xmlns:a="http://schemas.openxmlformats.org/drawingml/2006/main" xmlns:r="http://schemas.openxmlformats.org/officeDocument/2006/relationships" xmlns:p="http://schemas.openxmlformats.org/presentationml/2006/main">
   <p:cSld>
     <p:spTree>
@@ -20127,7 +20443,7 @@
             </a:pPr>
             <a:r>
               <a:rPr lang="en-US" sz="3600" dirty="0"/>
-              <a:t>+75 for obtaining food</a:t>
+              <a:t>+10 for obtaining food</a:t>
             </a:r>
           </a:p>
           <a:p>
@@ -20345,7 +20661,7 @@
                   <a:srgbClr val="00B050"/>
                 </a:solidFill>
               </a:rPr>
-              <a:t>+75</a:t>
+              <a:t>+10</a:t>
             </a:r>
           </a:p>
         </p:txBody>
@@ -20856,154 +21172,6 @@
     <p:extLst>
       <p:ext uri="{BB962C8B-B14F-4D97-AF65-F5344CB8AC3E}">
         <p14:creationId xmlns:p14="http://schemas.microsoft.com/office/powerpoint/2010/main" val="1656935891"/>
-      </p:ext>
-    </p:extLst>
-  </p:cSld>
-  <p:clrMapOvr>
-    <a:masterClrMapping/>
-  </p:clrMapOvr>
-</p:sld>
-</file>
-
-<file path=ppt/slides/slide9.xml><?xml version="1.0" encoding="utf-8"?>
-<p:sld xmlns:a="http://schemas.openxmlformats.org/drawingml/2006/main" xmlns:r="http://schemas.openxmlformats.org/officeDocument/2006/relationships" xmlns:p="http://schemas.openxmlformats.org/presentationml/2006/main">
-  <p:cSld>
-    <p:spTree>
-      <p:nvGrpSpPr>
-        <p:cNvPr id="1" name=""/>
-        <p:cNvGrpSpPr/>
-        <p:nvPr/>
-      </p:nvGrpSpPr>
-      <p:grpSpPr>
-        <a:xfrm>
-          <a:off x="0" y="0"/>
-          <a:ext cx="0" cy="0"/>
-          <a:chOff x="0" y="0"/>
-          <a:chExt cx="0" cy="0"/>
-        </a:xfrm>
-      </p:grpSpPr>
-      <p:sp>
-        <p:nvSpPr>
-          <p:cNvPr id="14" name="Title 13">
-            <a:extLst>
-              <a:ext uri="{FF2B5EF4-FFF2-40B4-BE49-F238E27FC236}">
-                <a16:creationId xmlns:a16="http://schemas.microsoft.com/office/drawing/2014/main" id="{40CAEEE8-1C27-46F9-8866-53F8378E13EB}"/>
-              </a:ext>
-            </a:extLst>
-          </p:cNvPr>
-          <p:cNvSpPr>
-            <a:spLocks noGrp="1"/>
-          </p:cNvSpPr>
-          <p:nvPr>
-            <p:ph type="title"/>
-          </p:nvPr>
-        </p:nvSpPr>
-        <p:spPr>
-          <a:xfrm>
-            <a:off x="987651" y="1050339"/>
-            <a:ext cx="6985416" cy="1666735"/>
-          </a:xfrm>
-        </p:spPr>
-        <p:txBody>
-          <a:bodyPr/>
-          <a:lstStyle/>
-          <a:p>
-            <a:r>
-              <a:rPr lang="en-US" sz="6000" dirty="0"/>
-              <a:t>Episode and Steps</a:t>
-            </a:r>
-          </a:p>
-        </p:txBody>
-      </p:sp>
-      <p:sp>
-        <p:nvSpPr>
-          <p:cNvPr id="15" name="Text Placeholder 14">
-            <a:extLst>
-              <a:ext uri="{FF2B5EF4-FFF2-40B4-BE49-F238E27FC236}">
-                <a16:creationId xmlns:a16="http://schemas.microsoft.com/office/drawing/2014/main" id="{EDB679B2-01F7-49A9-9AB4-77303BEE02FD}"/>
-              </a:ext>
-            </a:extLst>
-          </p:cNvPr>
-          <p:cNvSpPr>
-            <a:spLocks noGrp="1"/>
-          </p:cNvSpPr>
-          <p:nvPr>
-            <p:ph type="body" sz="quarter" idx="10"/>
-          </p:nvPr>
-        </p:nvSpPr>
-        <p:spPr>
-          <a:xfrm>
-            <a:off x="883148" y="2887739"/>
-            <a:ext cx="6985416" cy="5106730"/>
-          </a:xfrm>
-        </p:spPr>
-        <p:txBody>
-          <a:bodyPr/>
-          <a:lstStyle/>
-          <a:p>
-            <a:pPr marL="685800" indent="-685800">
-              <a:buFont typeface="Arial" panose="020B0604020202020204" pitchFamily="34" charset="0"/>
-              <a:buChar char="•"/>
-            </a:pPr>
-            <a:r>
-              <a:rPr lang="en-US" sz="4200" dirty="0"/>
-              <a:t>An episode is defined as going until the snake dies</a:t>
-            </a:r>
-          </a:p>
-          <a:p>
-            <a:pPr marL="685800" indent="-685800">
-              <a:buFont typeface="Arial" panose="020B0604020202020204" pitchFamily="34" charset="0"/>
-              <a:buChar char="•"/>
-            </a:pPr>
-            <a:r>
-              <a:rPr lang="en-US" sz="4200" dirty="0"/>
-              <a:t>Since episodes can get very large, the number of steps will be limited to 5,000</a:t>
-            </a:r>
-          </a:p>
-          <a:p>
-            <a:pPr marL="685800" indent="-685800">
-              <a:buFont typeface="Arial" panose="020B0604020202020204" pitchFamily="34" charset="0"/>
-              <a:buChar char="•"/>
-            </a:pPr>
-            <a:r>
-              <a:rPr lang="en-US" sz="4200" dirty="0"/>
-              <a:t>Variable number of episodes will be tried for training</a:t>
-            </a:r>
-          </a:p>
-        </p:txBody>
-      </p:sp>
-      <p:pic>
-        <p:nvPicPr>
-          <p:cNvPr id="19" name="Picture Placeholder 18">
-            <a:extLst>
-              <a:ext uri="{FF2B5EF4-FFF2-40B4-BE49-F238E27FC236}">
-                <a16:creationId xmlns:a16="http://schemas.microsoft.com/office/drawing/2014/main" id="{D6B0F15E-4CF1-4925-8236-D7CF8B747FB8}"/>
-              </a:ext>
-            </a:extLst>
-          </p:cNvPr>
-          <p:cNvPicPr>
-            <a:picLocks noGrp="1" noChangeAspect="1"/>
-          </p:cNvPicPr>
-          <p:nvPr>
-            <p:ph type="pic" sz="quarter" idx="15"/>
-          </p:nvPr>
-        </p:nvPicPr>
-        <p:blipFill rotWithShape="1">
-          <a:blip r:embed="rId2"/>
-          <a:srcRect l="239" t="-5851" b="-5851"/>
-          <a:stretch/>
-        </p:blipFill>
-        <p:spPr>
-          <a:xfrm>
-            <a:off x="9144000" y="0"/>
-            <a:ext cx="9144000" cy="10287000"/>
-          </a:xfrm>
-        </p:spPr>
-      </p:pic>
-    </p:spTree>
-    <p:extLst>
-      <p:ext uri="{BB962C8B-B14F-4D97-AF65-F5344CB8AC3E}">
-        <p14:creationId xmlns:p14="http://schemas.microsoft.com/office/powerpoint/2010/main" val="1342404109"/>
       </p:ext>
     </p:extLst>
   </p:cSld>

</xml_diff>

<commit_message>
add option to not render the game to speed up training
</commit_message>
<xml_diff>
--- a/presentation/ece559b_presentation.pptx
+++ b/presentation/ece559b_presentation.pptx
@@ -284,7 +284,7 @@
           <a:p>
             <a:fld id="{3B38BBD5-A164-49D8-82A5-B89DF7EB960D}" type="datetimeFigureOut">
               <a:rPr lang="en-US" smtClean="0"/>
-              <a:t>11/21/2021</a:t>
+              <a:t>11/23/2021</a:t>
             </a:fld>
             <a:endParaRPr lang="en-US"/>
           </a:p>
@@ -8427,7 +8427,7 @@
           <a:p>
             <a:pPr algn="ctr"/>
             <a:r>
-              <a:rPr lang="en-US" sz="5000" cap="none" dirty="0"/>
+              <a:rPr lang="en-US" sz="5000" cap="none"/>
               <a:t>Learning Snake with Deep Reinforcement Learning</a:t>
             </a:r>
             <a:endParaRPr lang="en-US" sz="5000" dirty="0"/>
@@ -8462,16 +8462,17 @@
           <a:p>
             <a:pPr algn="ctr"/>
             <a:r>
-              <a:rPr lang="en-US" dirty="0"/>
+              <a:rPr lang="en-US"/>
               <a:t>Tyrone Lagore </a:t>
             </a:r>
           </a:p>
           <a:p>
             <a:pPr algn="ctr"/>
             <a:r>
-              <a:rPr lang="en-US" dirty="0"/>
+              <a:rPr lang="en-US"/>
               <a:t>V00995698</a:t>
             </a:r>
+            <a:endParaRPr lang="en-US" dirty="0"/>
           </a:p>
         </p:txBody>
       </p:sp>
@@ -8495,41 +8496,6 @@
       </p:sp>
       <p:pic>
         <p:nvPicPr>
-          <p:cNvPr id="9" name="Picture 8" descr="abstract image">
-            <a:extLst>
-              <a:ext uri="{FF2B5EF4-FFF2-40B4-BE49-F238E27FC236}">
-                <a16:creationId xmlns:a16="http://schemas.microsoft.com/office/drawing/2014/main" id="{19C92F98-5A8F-49C8-A9D8-F028C754544E}"/>
-              </a:ext>
-            </a:extLst>
-          </p:cNvPr>
-          <p:cNvPicPr>
-            <a:picLocks noChangeAspect="1"/>
-          </p:cNvPicPr>
-          <p:nvPr/>
-        </p:nvPicPr>
-        <p:blipFill rotWithShape="1">
-          <a:blip r:embed="rId2">
-            <a:extLst>
-              <a:ext uri="{28A0092B-C50C-407E-A947-70E740481C1C}">
-                <a14:useLocalDpi xmlns:a14="http://schemas.microsoft.com/office/drawing/2010/main" val="0"/>
-              </a:ext>
-            </a:extLst>
-          </a:blip>
-          <a:srcRect/>
-          <a:stretch/>
-        </p:blipFill>
-        <p:spPr>
-          <a:xfrm>
-            <a:off x="6100993" y="10"/>
-            <a:ext cx="12187005" cy="10286990"/>
-          </a:xfrm>
-          <a:prstGeom prst="rect">
-            <a:avLst/>
-          </a:prstGeom>
-        </p:spPr>
-      </p:pic>
-      <p:pic>
-        <p:nvPicPr>
           <p:cNvPr id="10" name="Picture 9">
             <a:extLst>
               <a:ext uri="{FF2B5EF4-FFF2-40B4-BE49-F238E27FC236}">
@@ -8543,7 +8509,7 @@
           <p:nvPr/>
         </p:nvPicPr>
         <p:blipFill>
-          <a:blip r:embed="rId3"/>
+          <a:blip r:embed="rId2"/>
           <a:stretch>
             <a:fillRect/>
           </a:stretch>
@@ -8827,8 +8793,8 @@
           </a:p>
         </p:txBody>
       </p:sp>
-      <mc:AlternateContent xmlns:mc="http://schemas.openxmlformats.org/markup-compatibility/2006">
-        <mc:Choice xmlns:a14="http://schemas.microsoft.com/office/drawing/2010/main" Requires="a14">
+      <mc:AlternateContent xmlns:mc="http://schemas.openxmlformats.org/markup-compatibility/2006" xmlns:a14="http://schemas.microsoft.com/office/drawing/2010/main">
+        <mc:Choice Requires="a14">
           <p:sp>
             <p:nvSpPr>
               <p:cNvPr id="8" name="Text Placeholder 7">
@@ -9012,7 +8978,7 @@
             </p:txBody>
           </p:sp>
         </mc:Choice>
-        <mc:Fallback>
+        <mc:Fallback xmlns="">
           <p:sp>
             <p:nvSpPr>
               <p:cNvPr id="8" name="Text Placeholder 7">
@@ -15728,8 +15694,8 @@
           </a:p>
         </p:txBody>
       </p:sp>
-      <mc:AlternateContent xmlns:mc="http://schemas.openxmlformats.org/markup-compatibility/2006">
-        <mc:Choice xmlns:a14="http://schemas.microsoft.com/office/drawing/2010/main" Requires="a14">
+      <mc:AlternateContent xmlns:mc="http://schemas.openxmlformats.org/markup-compatibility/2006" xmlns:a14="http://schemas.microsoft.com/office/drawing/2010/main">
+        <mc:Choice Requires="a14">
           <p:sp>
             <p:nvSpPr>
               <p:cNvPr id="4" name="Text Placeholder 3">
@@ -15895,7 +15861,7 @@
             </p:txBody>
           </p:sp>
         </mc:Choice>
-        <mc:Fallback>
+        <mc:Fallback xmlns="">
           <p:sp>
             <p:nvSpPr>
               <p:cNvPr id="4" name="Text Placeholder 3">
@@ -16238,8 +16204,8 @@
           </a:p>
         </p:txBody>
       </p:sp>
-      <mc:AlternateContent xmlns:mc="http://schemas.openxmlformats.org/markup-compatibility/2006">
-        <mc:Choice xmlns:a14="http://schemas.microsoft.com/office/drawing/2010/main" Requires="a14">
+      <mc:AlternateContent xmlns:mc="http://schemas.openxmlformats.org/markup-compatibility/2006" xmlns:a14="http://schemas.microsoft.com/office/drawing/2010/main">
+        <mc:Choice Requires="a14">
           <p:sp>
             <p:nvSpPr>
               <p:cNvPr id="50" name="TextBox 49">
@@ -16409,7 +16375,7 @@
             </p:txBody>
           </p:sp>
         </mc:Choice>
-        <mc:Fallback>
+        <mc:Fallback xmlns="">
           <p:sp>
             <p:nvSpPr>
               <p:cNvPr id="50" name="TextBox 49">
@@ -17732,8 +17698,8 @@
           </a:p>
         </p:txBody>
       </p:sp>
-      <mc:AlternateContent xmlns:mc="http://schemas.openxmlformats.org/markup-compatibility/2006">
-        <mc:Choice xmlns:a14="http://schemas.microsoft.com/office/drawing/2010/main" Requires="a14">
+      <mc:AlternateContent xmlns:mc="http://schemas.openxmlformats.org/markup-compatibility/2006" xmlns:a14="http://schemas.microsoft.com/office/drawing/2010/main">
+        <mc:Choice Requires="a14">
           <p:sp>
             <p:nvSpPr>
               <p:cNvPr id="4" name="Text Placeholder 3">
@@ -17848,7 +17814,7 @@
                     <m:sSup>
                       <m:sSupPr>
                         <m:ctrlPr>
-                          <a:rPr lang="en-US" sz="2600" b="0" i="0" smtClean="0">
+                          <a:rPr lang="en-US" sz="2600" b="0" i="1" smtClean="0">
                             <a:solidFill>
                               <a:schemeClr val="bg1"/>
                             </a:solidFill>
@@ -17916,7 +17882,7 @@
             </p:txBody>
           </p:sp>
         </mc:Choice>
-        <mc:Fallback>
+        <mc:Fallback xmlns="">
           <p:sp>
             <p:nvSpPr>
               <p:cNvPr id="4" name="Text Placeholder 3">
@@ -18870,7 +18836,49 @@
             </a:pPr>
             <a:r>
               <a:rPr lang="en-US" sz="3600" dirty="0"/>
-              <a:t>At an state, the snake may go any direction but the direction it is coming from</a:t>
+              <a:t>At an state, the snake may </a:t>
+            </a:r>
+          </a:p>
+          <a:p>
+            <a:pPr marL="2171576" lvl="1" indent="-685800">
+              <a:buFont typeface="+mj-lt"/>
+              <a:buAutoNum type="arabicPeriod"/>
+            </a:pPr>
+            <a:r>
+              <a:rPr lang="en-US" sz="3000" dirty="0">
+                <a:solidFill>
+                  <a:schemeClr val="bg1"/>
+                </a:solidFill>
+              </a:rPr>
+              <a:t>Turn Left</a:t>
+            </a:r>
+          </a:p>
+          <a:p>
+            <a:pPr marL="2171576" lvl="1" indent="-685800">
+              <a:buFont typeface="+mj-lt"/>
+              <a:buAutoNum type="arabicPeriod"/>
+            </a:pPr>
+            <a:r>
+              <a:rPr lang="en-US" sz="3000" dirty="0">
+                <a:solidFill>
+                  <a:schemeClr val="bg1"/>
+                </a:solidFill>
+              </a:rPr>
+              <a:t>Turn Right</a:t>
+            </a:r>
+          </a:p>
+          <a:p>
+            <a:pPr marL="2171576" lvl="1" indent="-685800">
+              <a:buFont typeface="+mj-lt"/>
+              <a:buAutoNum type="arabicPeriod"/>
+            </a:pPr>
+            <a:r>
+              <a:rPr lang="en-US" sz="3000" dirty="0">
+                <a:solidFill>
+                  <a:schemeClr val="bg1"/>
+                </a:solidFill>
+              </a:rPr>
+              <a:t>Continue Straight</a:t>
             </a:r>
           </a:p>
           <a:p>
@@ -20132,146 +20140,6 @@
             <a:r>
               <a:rPr lang="en-US" sz="3600" dirty="0"/>
               <a:t>Moving Up</a:t>
-            </a:r>
-          </a:p>
-        </p:txBody>
-      </p:sp>
-      <p:sp>
-        <p:nvSpPr>
-          <p:cNvPr id="41" name="TextBox 40">
-            <a:extLst>
-              <a:ext uri="{FF2B5EF4-FFF2-40B4-BE49-F238E27FC236}">
-                <a16:creationId xmlns:a16="http://schemas.microsoft.com/office/drawing/2014/main" id="{731E6B2F-49D1-4D57-A317-CAF578B2922C}"/>
-              </a:ext>
-            </a:extLst>
-          </p:cNvPr>
-          <p:cNvSpPr txBox="1"/>
-          <p:nvPr/>
-        </p:nvSpPr>
-        <p:spPr>
-          <a:xfrm>
-            <a:off x="557374" y="4275315"/>
-            <a:ext cx="4020460" cy="369332"/>
-          </a:xfrm>
-          <a:prstGeom prst="rect">
-            <a:avLst/>
-          </a:prstGeom>
-          <a:noFill/>
-        </p:spPr>
-        <p:txBody>
-          <a:bodyPr wrap="none" rtlCol="0">
-            <a:spAutoFit/>
-          </a:bodyPr>
-          <a:lstStyle/>
-          <a:p>
-            <a:r>
-              <a:rPr lang="en-US" dirty="0"/>
-              <a:t>Agent can go up, down, or continue right</a:t>
-            </a:r>
-          </a:p>
-        </p:txBody>
-      </p:sp>
-      <p:sp>
-        <p:nvSpPr>
-          <p:cNvPr id="65" name="TextBox 64">
-            <a:extLst>
-              <a:ext uri="{FF2B5EF4-FFF2-40B4-BE49-F238E27FC236}">
-                <a16:creationId xmlns:a16="http://schemas.microsoft.com/office/drawing/2014/main" id="{0A02AC1D-EDF6-4D1C-938B-228CFC5109FC}"/>
-              </a:ext>
-            </a:extLst>
-          </p:cNvPr>
-          <p:cNvSpPr txBox="1"/>
-          <p:nvPr/>
-        </p:nvSpPr>
-        <p:spPr>
-          <a:xfrm>
-            <a:off x="4941929" y="4275315"/>
-            <a:ext cx="3895490" cy="369332"/>
-          </a:xfrm>
-          <a:prstGeom prst="rect">
-            <a:avLst/>
-          </a:prstGeom>
-          <a:noFill/>
-        </p:spPr>
-        <p:txBody>
-          <a:bodyPr wrap="none" rtlCol="0">
-            <a:spAutoFit/>
-          </a:bodyPr>
-          <a:lstStyle/>
-          <a:p>
-            <a:r>
-              <a:rPr lang="en-US" dirty="0"/>
-              <a:t>Agent can go up, down, or continue left</a:t>
-            </a:r>
-          </a:p>
-        </p:txBody>
-      </p:sp>
-      <p:sp>
-        <p:nvSpPr>
-          <p:cNvPr id="66" name="TextBox 65">
-            <a:extLst>
-              <a:ext uri="{FF2B5EF4-FFF2-40B4-BE49-F238E27FC236}">
-                <a16:creationId xmlns:a16="http://schemas.microsoft.com/office/drawing/2014/main" id="{6F845EDE-7DB1-4B20-975B-8861BD8FD7A1}"/>
-              </a:ext>
-            </a:extLst>
-          </p:cNvPr>
-          <p:cNvSpPr txBox="1"/>
-          <p:nvPr/>
-        </p:nvSpPr>
-        <p:spPr>
-          <a:xfrm>
-            <a:off x="5026078" y="8721061"/>
-            <a:ext cx="3804503" cy="369332"/>
-          </a:xfrm>
-          <a:prstGeom prst="rect">
-            <a:avLst/>
-          </a:prstGeom>
-          <a:noFill/>
-        </p:spPr>
-        <p:txBody>
-          <a:bodyPr wrap="none" rtlCol="0">
-            <a:spAutoFit/>
-          </a:bodyPr>
-          <a:lstStyle/>
-          <a:p>
-            <a:r>
-              <a:rPr lang="en-US" dirty="0"/>
-              <a:t>Agent can go left, right, or continue up</a:t>
-            </a:r>
-          </a:p>
-        </p:txBody>
-      </p:sp>
-      <p:sp>
-        <p:nvSpPr>
-          <p:cNvPr id="67" name="TextBox 66">
-            <a:extLst>
-              <a:ext uri="{FF2B5EF4-FFF2-40B4-BE49-F238E27FC236}">
-                <a16:creationId xmlns:a16="http://schemas.microsoft.com/office/drawing/2014/main" id="{D02BC429-A0ED-4980-AC6D-197C484E502A}"/>
-              </a:ext>
-            </a:extLst>
-          </p:cNvPr>
-          <p:cNvSpPr txBox="1"/>
-          <p:nvPr/>
-        </p:nvSpPr>
-        <p:spPr>
-          <a:xfrm>
-            <a:off x="575063" y="8721061"/>
-            <a:ext cx="4090543" cy="369332"/>
-          </a:xfrm>
-          <a:prstGeom prst="rect">
-            <a:avLst/>
-          </a:prstGeom>
-          <a:noFill/>
-        </p:spPr>
-        <p:txBody>
-          <a:bodyPr wrap="none" rtlCol="0">
-            <a:spAutoFit/>
-          </a:bodyPr>
-          <a:lstStyle/>
-          <a:p>
-            <a:r>
-              <a:rPr lang="en-US" dirty="0"/>
-              <a:t>Agent can go left, right, or continue down</a:t>
             </a:r>
           </a:p>
         </p:txBody>

</xml_diff>